<commit_message>
Modificacion del tamaño del titulo; adicion de algunos comandos y su descripcion(hasta commit)
</commit_message>
<xml_diff>
--- a/presentasionComandos.pptx
+++ b/presentasionComandos.pptx
@@ -6,6 +6,7 @@
   </p:sldMasterIdLst>
   <p:sldIdLst>
     <p:sldId id="256" r:id="rId3"/>
+    <p:sldId id="257" r:id="rId4"/>
   </p:sldIdLst>
   <p:sldSz cx="12192000" cy="6858000"/>
   <p:notesSz cx="6858000" cy="12192000"/>
@@ -108,7 +109,7 @@
 </file>
 
 <file path=ppt/slideLayouts/slideLayout1.xml><?xml version="1.0" encoding="utf-8"?>
-<p:sldLayout xmlns:a="http://schemas.openxmlformats.org/drawingml/2006/main" xmlns:r="http://schemas.openxmlformats.org/officeDocument/2006/relationships" xmlns:p="http://schemas.openxmlformats.org/presentationml/2006/main" xmlns:m="http://schemas.openxmlformats.org/officeDocument/2006/math" xmlns:w="http://schemas.openxmlformats.org/wordprocessingml/2006/main" matchingName="" preserve="1" showMasterPhAnim="0" type="title" userDrawn="1">
+<p:sldLayout xmlns:a="http://schemas.openxmlformats.org/drawingml/2006/main" xmlns:r="http://schemas.openxmlformats.org/officeDocument/2006/relationships" xmlns:p="http://schemas.openxmlformats.org/presentationml/2006/main" xmlns:m="http://schemas.openxmlformats.org/officeDocument/2006/math" xmlns:w="http://schemas.openxmlformats.org/wordprocessingml/2006/main" matchingName="" preserve="0" showMasterPhAnim="0" type="title" userDrawn="1">
   <p:cSld name="Title Slide">
     <p:spTree>
       <p:nvGrpSpPr>
@@ -136,15 +137,15 @@
         </p:nvSpPr>
         <p:spPr bwMode="auto">
           <a:xfrm>
-            <a:off x="1524000" y="1122363"/>
-            <a:ext cx="9144000" cy="2387600"/>
+            <a:off x="1523999" y="1122362"/>
+            <a:ext cx="9144000" cy="2387599"/>
           </a:xfrm>
         </p:spPr>
         <p:txBody>
           <a:bodyPr anchor="b"/>
           <a:lstStyle>
             <a:lvl1pPr algn="ctr">
-              <a:defRPr sz="6000"/>
+              <a:defRPr sz="4500"/>
             </a:lvl1pPr>
           </a:lstStyle>
           <a:p>
@@ -171,7 +172,7 @@
         </p:nvSpPr>
         <p:spPr bwMode="auto">
           <a:xfrm>
-            <a:off x="1524000" y="3602038"/>
+            <a:off x="1523999" y="3602037"/>
             <a:ext cx="9144000" cy="1655762"/>
           </a:xfrm>
         </p:spPr>
@@ -180,39 +181,39 @@
           <a:lstStyle>
             <a:lvl1pPr marL="0" indent="0" algn="ctr">
               <a:buNone/>
-              <a:defRPr sz="2400"/>
+              <a:defRPr sz="1800"/>
             </a:lvl1pPr>
-            <a:lvl2pPr marL="457200" indent="0" algn="ctr">
-              <a:buNone/>
-              <a:defRPr sz="2000"/>
+            <a:lvl2pPr marL="342900" indent="0" algn="ctr">
+              <a:buNone/>
+              <a:defRPr sz="1500"/>
             </a:lvl2pPr>
-            <a:lvl3pPr marL="914400" indent="0" algn="ctr">
-              <a:buNone/>
-              <a:defRPr sz="1800"/>
+            <a:lvl3pPr marL="685800" indent="0" algn="ctr">
+              <a:buNone/>
+              <a:defRPr sz="1350"/>
             </a:lvl3pPr>
-            <a:lvl4pPr marL="1371600" indent="0" algn="ctr">
-              <a:buNone/>
-              <a:defRPr sz="1600"/>
+            <a:lvl4pPr marL="1028700" indent="0" algn="ctr">
+              <a:buNone/>
+              <a:defRPr sz="1200"/>
             </a:lvl4pPr>
-            <a:lvl5pPr marL="1828800" indent="0" algn="ctr">
-              <a:buNone/>
-              <a:defRPr sz="1600"/>
+            <a:lvl5pPr marL="1371600" indent="0" algn="ctr">
+              <a:buNone/>
+              <a:defRPr sz="1200"/>
             </a:lvl5pPr>
-            <a:lvl6pPr marL="2286000" indent="0" algn="ctr">
-              <a:buNone/>
-              <a:defRPr sz="1600"/>
+            <a:lvl6pPr marL="1714500" indent="0" algn="ctr">
+              <a:buNone/>
+              <a:defRPr sz="1200"/>
             </a:lvl6pPr>
-            <a:lvl7pPr marL="2743200" indent="0" algn="ctr">
-              <a:buNone/>
-              <a:defRPr sz="1600"/>
+            <a:lvl7pPr marL="2057400" indent="0" algn="ctr">
+              <a:buNone/>
+              <a:defRPr sz="1200"/>
             </a:lvl7pPr>
-            <a:lvl8pPr marL="3200400" indent="0" algn="ctr">
-              <a:buNone/>
-              <a:defRPr sz="1600"/>
+            <a:lvl8pPr marL="2400300" indent="0" algn="ctr">
+              <a:buNone/>
+              <a:defRPr sz="1200"/>
             </a:lvl8pPr>
-            <a:lvl9pPr marL="3657600" indent="0" algn="ctr">
-              <a:buNone/>
-              <a:defRPr sz="1600"/>
+            <a:lvl9pPr marL="2743200" indent="0" algn="ctr">
+              <a:buNone/>
+              <a:defRPr sz="1200"/>
             </a:lvl9pPr>
           </a:lstStyle>
           <a:p>
@@ -246,10 +247,10 @@
               <a:defRPr/>
             </a:pPr>
             <a:fld id="{BCC18F51-09EC-435C-A3BA-64A766E099C0}" type="datetimeFigureOut">
-              <a:rPr lang="en-US"/>
+              <a:rPr lang="ru-RU"/>
               <a:t/>
             </a:fld>
-            <a:endParaRPr lang="en-US"/>
+            <a:endParaRPr lang="ru-RU"/>
           </a:p>
         </p:txBody>
       </p:sp>
@@ -271,7 +272,7 @@
             <a:pPr>
               <a:defRPr/>
             </a:pPr>
-            <a:endParaRPr lang="en-US"/>
+            <a:endParaRPr lang="ru-RU"/>
           </a:p>
         </p:txBody>
       </p:sp>
@@ -294,10 +295,10 @@
               <a:defRPr/>
             </a:pPr>
             <a:fld id="{08395586-F03A-48D1-94DF-16B239DF4FB5}" type="slidenum">
-              <a:rPr lang="en-US"/>
+              <a:rPr lang="ru-RU"/>
               <a:t/>
             </a:fld>
-            <a:endParaRPr lang="en-US"/>
+            <a:endParaRPr lang="ru-RU"/>
           </a:p>
         </p:txBody>
       </p:sp>
@@ -310,7 +311,7 @@
 </file>
 
 <file path=ppt/slideLayouts/slideLayout10.xml><?xml version="1.0" encoding="utf-8"?>
-<p:sldLayout xmlns:a="http://schemas.openxmlformats.org/drawingml/2006/main" xmlns:r="http://schemas.openxmlformats.org/officeDocument/2006/relationships" xmlns:p="http://schemas.openxmlformats.org/presentationml/2006/main" xmlns:m="http://schemas.openxmlformats.org/officeDocument/2006/math" xmlns:w="http://schemas.openxmlformats.org/wordprocessingml/2006/main" matchingName="" preserve="1" showMasterPhAnim="0" type="vertTx" userDrawn="1">
+<p:sldLayout xmlns:a="http://schemas.openxmlformats.org/drawingml/2006/main" xmlns:r="http://schemas.openxmlformats.org/officeDocument/2006/relationships" xmlns:p="http://schemas.openxmlformats.org/presentationml/2006/main" xmlns:m="http://schemas.openxmlformats.org/officeDocument/2006/math" xmlns:w="http://schemas.openxmlformats.org/wordprocessingml/2006/main" matchingName="" preserve="0" showMasterPhAnim="0" type="vertTx" userDrawn="1">
   <p:cSld name="Title and Vertical Text">
     <p:spTree>
       <p:nvGrpSpPr>
@@ -437,10 +438,10 @@
               <a:defRPr/>
             </a:pPr>
             <a:fld id="{BCC18F51-09EC-435C-A3BA-64A766E099C0}" type="datetimeFigureOut">
-              <a:rPr lang="en-US"/>
+              <a:rPr lang="ru-RU"/>
               <a:t/>
             </a:fld>
-            <a:endParaRPr lang="en-US"/>
+            <a:endParaRPr lang="ru-RU"/>
           </a:p>
         </p:txBody>
       </p:sp>
@@ -462,7 +463,7 @@
             <a:pPr>
               <a:defRPr/>
             </a:pPr>
-            <a:endParaRPr lang="en-US"/>
+            <a:endParaRPr lang="ru-RU"/>
           </a:p>
         </p:txBody>
       </p:sp>
@@ -485,10 +486,10 @@
               <a:defRPr/>
             </a:pPr>
             <a:fld id="{08395586-F03A-48D1-94DF-16B239DF4FB5}" type="slidenum">
-              <a:rPr lang="en-US"/>
+              <a:rPr lang="ru-RU"/>
               <a:t/>
             </a:fld>
-            <a:endParaRPr lang="en-US"/>
+            <a:endParaRPr lang="ru-RU"/>
           </a:p>
         </p:txBody>
       </p:sp>
@@ -501,7 +502,7 @@
 </file>
 
 <file path=ppt/slideLayouts/slideLayout11.xml><?xml version="1.0" encoding="utf-8"?>
-<p:sldLayout xmlns:a="http://schemas.openxmlformats.org/drawingml/2006/main" xmlns:r="http://schemas.openxmlformats.org/officeDocument/2006/relationships" xmlns:p="http://schemas.openxmlformats.org/presentationml/2006/main" xmlns:m="http://schemas.openxmlformats.org/officeDocument/2006/math" xmlns:w="http://schemas.openxmlformats.org/wordprocessingml/2006/main" matchingName="" preserve="1" showMasterPhAnim="0" type="vertTitleAndTx" userDrawn="1">
+<p:sldLayout xmlns:a="http://schemas.openxmlformats.org/drawingml/2006/main" xmlns:r="http://schemas.openxmlformats.org/officeDocument/2006/relationships" xmlns:p="http://schemas.openxmlformats.org/presentationml/2006/main" xmlns:m="http://schemas.openxmlformats.org/officeDocument/2006/math" xmlns:w="http://schemas.openxmlformats.org/wordprocessingml/2006/main" matchingName="" preserve="0" showMasterPhAnim="0" type="vertTitleAndTx" userDrawn="1">
   <p:cSld name="Vertical Title and Text">
     <p:spTree>
       <p:nvGrpSpPr>
@@ -529,7 +530,7 @@
         </p:nvSpPr>
         <p:spPr bwMode="auto">
           <a:xfrm>
-            <a:off x="8724900" y="365125"/>
+            <a:off x="8724899" y="365125"/>
             <a:ext cx="2628900" cy="5811838"/>
           </a:xfrm>
         </p:spPr>
@@ -560,8 +561,8 @@
         </p:nvSpPr>
         <p:spPr bwMode="auto">
           <a:xfrm>
-            <a:off x="838200" y="365125"/>
-            <a:ext cx="7734300" cy="5811838"/>
+            <a:off x="838199" y="365125"/>
+            <a:ext cx="7734299" cy="5811838"/>
           </a:xfrm>
         </p:spPr>
         <p:txBody>
@@ -638,10 +639,10 @@
               <a:defRPr/>
             </a:pPr>
             <a:fld id="{BCC18F51-09EC-435C-A3BA-64A766E099C0}" type="datetimeFigureOut">
-              <a:rPr lang="en-US"/>
+              <a:rPr lang="ru-RU"/>
               <a:t/>
             </a:fld>
-            <a:endParaRPr lang="en-US"/>
+            <a:endParaRPr lang="ru-RU"/>
           </a:p>
         </p:txBody>
       </p:sp>
@@ -663,7 +664,7 @@
             <a:pPr>
               <a:defRPr/>
             </a:pPr>
-            <a:endParaRPr lang="en-US"/>
+            <a:endParaRPr lang="ru-RU"/>
           </a:p>
         </p:txBody>
       </p:sp>
@@ -686,10 +687,10 @@
               <a:defRPr/>
             </a:pPr>
             <a:fld id="{08395586-F03A-48D1-94DF-16B239DF4FB5}" type="slidenum">
-              <a:rPr lang="en-US"/>
+              <a:rPr lang="ru-RU"/>
               <a:t/>
             </a:fld>
-            <a:endParaRPr lang="en-US"/>
+            <a:endParaRPr lang="ru-RU"/>
           </a:p>
         </p:txBody>
       </p:sp>
@@ -702,7 +703,7 @@
 </file>
 
 <file path=ppt/slideLayouts/slideLayout2.xml><?xml version="1.0" encoding="utf-8"?>
-<p:sldLayout xmlns:a="http://schemas.openxmlformats.org/drawingml/2006/main" xmlns:r="http://schemas.openxmlformats.org/officeDocument/2006/relationships" xmlns:p="http://schemas.openxmlformats.org/presentationml/2006/main" xmlns:m="http://schemas.openxmlformats.org/officeDocument/2006/math" xmlns:w="http://schemas.openxmlformats.org/wordprocessingml/2006/main" matchingName="" preserve="1" showMasterPhAnim="0" type="obj" userDrawn="1">
+<p:sldLayout xmlns:a="http://schemas.openxmlformats.org/drawingml/2006/main" xmlns:r="http://schemas.openxmlformats.org/officeDocument/2006/relationships" xmlns:p="http://schemas.openxmlformats.org/presentationml/2006/main" xmlns:m="http://schemas.openxmlformats.org/officeDocument/2006/math" xmlns:w="http://schemas.openxmlformats.org/wordprocessingml/2006/main" matchingName="" preserve="0" showMasterPhAnim="0" type="obj" userDrawn="1">
   <p:cSld name="Title and Content">
     <p:spTree>
       <p:nvGrpSpPr>
@@ -829,10 +830,10 @@
               <a:defRPr/>
             </a:pPr>
             <a:fld id="{BCC18F51-09EC-435C-A3BA-64A766E099C0}" type="datetimeFigureOut">
-              <a:rPr lang="en-US"/>
+              <a:rPr lang="ru-RU"/>
               <a:t/>
             </a:fld>
-            <a:endParaRPr lang="en-US"/>
+            <a:endParaRPr lang="ru-RU"/>
           </a:p>
         </p:txBody>
       </p:sp>
@@ -854,7 +855,7 @@
             <a:pPr>
               <a:defRPr/>
             </a:pPr>
-            <a:endParaRPr lang="en-US"/>
+            <a:endParaRPr lang="ru-RU"/>
           </a:p>
         </p:txBody>
       </p:sp>
@@ -877,10 +878,10 @@
               <a:defRPr/>
             </a:pPr>
             <a:fld id="{08395586-F03A-48D1-94DF-16B239DF4FB5}" type="slidenum">
-              <a:rPr lang="en-US"/>
+              <a:rPr lang="ru-RU"/>
               <a:t/>
             </a:fld>
-            <a:endParaRPr lang="en-US"/>
+            <a:endParaRPr lang="ru-RU"/>
           </a:p>
         </p:txBody>
       </p:sp>
@@ -893,7 +894,7 @@
 </file>
 
 <file path=ppt/slideLayouts/slideLayout3.xml><?xml version="1.0" encoding="utf-8"?>
-<p:sldLayout xmlns:a="http://schemas.openxmlformats.org/drawingml/2006/main" xmlns:r="http://schemas.openxmlformats.org/officeDocument/2006/relationships" xmlns:p="http://schemas.openxmlformats.org/presentationml/2006/main" xmlns:m="http://schemas.openxmlformats.org/officeDocument/2006/math" xmlns:w="http://schemas.openxmlformats.org/wordprocessingml/2006/main" matchingName="" preserve="1" showMasterPhAnim="0" type="secHead" userDrawn="1">
+<p:sldLayout xmlns:a="http://schemas.openxmlformats.org/drawingml/2006/main" xmlns:r="http://schemas.openxmlformats.org/officeDocument/2006/relationships" xmlns:p="http://schemas.openxmlformats.org/presentationml/2006/main" xmlns:m="http://schemas.openxmlformats.org/officeDocument/2006/math" xmlns:w="http://schemas.openxmlformats.org/wordprocessingml/2006/main" matchingName="" preserve="0" showMasterPhAnim="0" type="secHead" userDrawn="1">
   <p:cSld name="Section Header">
     <p:spTree>
       <p:nvGrpSpPr>
@@ -929,7 +930,7 @@
           <a:bodyPr anchor="b"/>
           <a:lstStyle>
             <a:lvl1pPr>
-              <a:defRPr sz="6000"/>
+              <a:defRPr sz="4500"/>
             </a:lvl1pPr>
           </a:lstStyle>
           <a:p>
@@ -957,7 +958,7 @@
         <p:spPr bwMode="auto">
           <a:xfrm>
             <a:off x="831850" y="4589463"/>
-            <a:ext cx="10515600" cy="1500187"/>
+            <a:ext cx="10515600" cy="1500186"/>
           </a:xfrm>
         </p:spPr>
         <p:txBody>
@@ -965,7 +966,7 @@
           <a:lstStyle>
             <a:lvl1pPr marL="0" indent="0">
               <a:buNone/>
-              <a:defRPr sz="2400">
+              <a:defRPr sz="1800">
                 <a:solidFill>
                   <a:schemeClr val="tx1">
                     <a:tint val="75000"/>
@@ -973,9 +974,9 @@
                 </a:solidFill>
               </a:defRPr>
             </a:lvl1pPr>
-            <a:lvl2pPr marL="457200" indent="0">
-              <a:buNone/>
-              <a:defRPr sz="2000">
+            <a:lvl2pPr marL="342900" indent="0">
+              <a:buNone/>
+              <a:defRPr sz="1500">
                 <a:solidFill>
                   <a:schemeClr val="tx1">
                     <a:tint val="75000"/>
@@ -983,9 +984,9 @@
                 </a:solidFill>
               </a:defRPr>
             </a:lvl2pPr>
-            <a:lvl3pPr marL="914400" indent="0">
-              <a:buNone/>
-              <a:defRPr sz="1800">
+            <a:lvl3pPr marL="685800" indent="0">
+              <a:buNone/>
+              <a:defRPr sz="1350">
                 <a:solidFill>
                   <a:schemeClr val="tx1">
                     <a:tint val="75000"/>
@@ -993,9 +994,9 @@
                 </a:solidFill>
               </a:defRPr>
             </a:lvl3pPr>
-            <a:lvl4pPr marL="1371600" indent="0">
-              <a:buNone/>
-              <a:defRPr sz="1600">
+            <a:lvl4pPr marL="1028700" indent="0">
+              <a:buNone/>
+              <a:defRPr sz="1200">
                 <a:solidFill>
                   <a:schemeClr val="tx1">
                     <a:tint val="75000"/>
@@ -1003,9 +1004,9 @@
                 </a:solidFill>
               </a:defRPr>
             </a:lvl4pPr>
-            <a:lvl5pPr marL="1828800" indent="0">
-              <a:buNone/>
-              <a:defRPr sz="1600">
+            <a:lvl5pPr marL="1371600" indent="0">
+              <a:buNone/>
+              <a:defRPr sz="1200">
                 <a:solidFill>
                   <a:schemeClr val="tx1">
                     <a:tint val="75000"/>
@@ -1013,9 +1014,9 @@
                 </a:solidFill>
               </a:defRPr>
             </a:lvl5pPr>
-            <a:lvl6pPr marL="2286000" indent="0">
-              <a:buNone/>
-              <a:defRPr sz="1600">
+            <a:lvl6pPr marL="1714500" indent="0">
+              <a:buNone/>
+              <a:defRPr sz="1200">
                 <a:solidFill>
                   <a:schemeClr val="tx1">
                     <a:tint val="75000"/>
@@ -1023,9 +1024,9 @@
                 </a:solidFill>
               </a:defRPr>
             </a:lvl6pPr>
-            <a:lvl7pPr marL="2743200" indent="0">
-              <a:buNone/>
-              <a:defRPr sz="1600">
+            <a:lvl7pPr marL="2057400" indent="0">
+              <a:buNone/>
+              <a:defRPr sz="1200">
                 <a:solidFill>
                   <a:schemeClr val="tx1">
                     <a:tint val="75000"/>
@@ -1033,9 +1034,9 @@
                 </a:solidFill>
               </a:defRPr>
             </a:lvl7pPr>
-            <a:lvl8pPr marL="3200400" indent="0">
-              <a:buNone/>
-              <a:defRPr sz="1600">
+            <a:lvl8pPr marL="2400300" indent="0">
+              <a:buNone/>
+              <a:defRPr sz="1200">
                 <a:solidFill>
                   <a:schemeClr val="tx1">
                     <a:tint val="75000"/>
@@ -1043,9 +1044,9 @@
                 </a:solidFill>
               </a:defRPr>
             </a:lvl8pPr>
-            <a:lvl9pPr marL="3657600" indent="0">
-              <a:buNone/>
-              <a:defRPr sz="1600">
+            <a:lvl9pPr marL="2743200" indent="0">
+              <a:buNone/>
+              <a:defRPr sz="1200">
                 <a:solidFill>
                   <a:schemeClr val="tx1">
                     <a:tint val="75000"/>
@@ -1085,10 +1086,10 @@
               <a:defRPr/>
             </a:pPr>
             <a:fld id="{BCC18F51-09EC-435C-A3BA-64A766E099C0}" type="datetimeFigureOut">
-              <a:rPr lang="en-US"/>
+              <a:rPr lang="ru-RU"/>
               <a:t/>
             </a:fld>
-            <a:endParaRPr lang="en-US"/>
+            <a:endParaRPr lang="ru-RU"/>
           </a:p>
         </p:txBody>
       </p:sp>
@@ -1110,7 +1111,7 @@
             <a:pPr>
               <a:defRPr/>
             </a:pPr>
-            <a:endParaRPr lang="en-US"/>
+            <a:endParaRPr lang="ru-RU"/>
           </a:p>
         </p:txBody>
       </p:sp>
@@ -1133,10 +1134,10 @@
               <a:defRPr/>
             </a:pPr>
             <a:fld id="{08395586-F03A-48D1-94DF-16B239DF4FB5}" type="slidenum">
-              <a:rPr lang="en-US"/>
+              <a:rPr lang="ru-RU"/>
               <a:t/>
             </a:fld>
-            <a:endParaRPr lang="en-US"/>
+            <a:endParaRPr lang="ru-RU"/>
           </a:p>
         </p:txBody>
       </p:sp>
@@ -1149,7 +1150,7 @@
 </file>
 
 <file path=ppt/slideLayouts/slideLayout4.xml><?xml version="1.0" encoding="utf-8"?>
-<p:sldLayout xmlns:a="http://schemas.openxmlformats.org/drawingml/2006/main" xmlns:r="http://schemas.openxmlformats.org/officeDocument/2006/relationships" xmlns:p="http://schemas.openxmlformats.org/presentationml/2006/main" xmlns:m="http://schemas.openxmlformats.org/officeDocument/2006/math" xmlns:w="http://schemas.openxmlformats.org/wordprocessingml/2006/main" matchingName="" preserve="1" showMasterPhAnim="0" type="twoObj" userDrawn="1">
+<p:sldLayout xmlns:a="http://schemas.openxmlformats.org/drawingml/2006/main" xmlns:r="http://schemas.openxmlformats.org/officeDocument/2006/relationships" xmlns:p="http://schemas.openxmlformats.org/presentationml/2006/main" xmlns:m="http://schemas.openxmlformats.org/officeDocument/2006/math" xmlns:w="http://schemas.openxmlformats.org/wordprocessingml/2006/main" matchingName="" preserve="0" showMasterPhAnim="0" type="twoObj" userDrawn="1">
   <p:cSld name="Two Content">
     <p:spTree>
       <p:nvGrpSpPr>
@@ -1203,8 +1204,8 @@
         </p:nvSpPr>
         <p:spPr bwMode="auto">
           <a:xfrm>
-            <a:off x="838200" y="1825625"/>
-            <a:ext cx="5181600" cy="4351338"/>
+            <a:off x="838199" y="1825625"/>
+            <a:ext cx="5181599" cy="4351338"/>
           </a:xfrm>
         </p:spPr>
         <p:txBody>
@@ -1275,7 +1276,7 @@
         <p:spPr bwMode="auto">
           <a:xfrm>
             <a:off x="6172200" y="1825625"/>
-            <a:ext cx="5181600" cy="4351338"/>
+            <a:ext cx="5181599" cy="4351338"/>
           </a:xfrm>
         </p:spPr>
         <p:txBody>
@@ -1352,10 +1353,10 @@
               <a:defRPr/>
             </a:pPr>
             <a:fld id="{BCC18F51-09EC-435C-A3BA-64A766E099C0}" type="datetimeFigureOut">
-              <a:rPr lang="en-US"/>
+              <a:rPr lang="ru-RU"/>
               <a:t/>
             </a:fld>
-            <a:endParaRPr lang="en-US"/>
+            <a:endParaRPr lang="ru-RU"/>
           </a:p>
         </p:txBody>
       </p:sp>
@@ -1377,7 +1378,7 @@
             <a:pPr>
               <a:defRPr/>
             </a:pPr>
-            <a:endParaRPr lang="en-US"/>
+            <a:endParaRPr lang="ru-RU"/>
           </a:p>
         </p:txBody>
       </p:sp>
@@ -1400,10 +1401,10 @@
               <a:defRPr/>
             </a:pPr>
             <a:fld id="{08395586-F03A-48D1-94DF-16B239DF4FB5}" type="slidenum">
-              <a:rPr lang="en-US"/>
+              <a:rPr lang="ru-RU"/>
               <a:t/>
             </a:fld>
-            <a:endParaRPr lang="en-US"/>
+            <a:endParaRPr lang="ru-RU"/>
           </a:p>
         </p:txBody>
       </p:sp>
@@ -1416,7 +1417,7 @@
 </file>
 
 <file path=ppt/slideLayouts/slideLayout5.xml><?xml version="1.0" encoding="utf-8"?>
-<p:sldLayout xmlns:a="http://schemas.openxmlformats.org/drawingml/2006/main" xmlns:r="http://schemas.openxmlformats.org/officeDocument/2006/relationships" xmlns:p="http://schemas.openxmlformats.org/presentationml/2006/main" xmlns:m="http://schemas.openxmlformats.org/officeDocument/2006/math" xmlns:w="http://schemas.openxmlformats.org/wordprocessingml/2006/main" matchingName="" preserve="1" showMasterPhAnim="0" type="twoTxTwoObj" userDrawn="1">
+<p:sldLayout xmlns:a="http://schemas.openxmlformats.org/drawingml/2006/main" xmlns:r="http://schemas.openxmlformats.org/officeDocument/2006/relationships" xmlns:p="http://schemas.openxmlformats.org/presentationml/2006/main" xmlns:m="http://schemas.openxmlformats.org/officeDocument/2006/math" xmlns:w="http://schemas.openxmlformats.org/wordprocessingml/2006/main" matchingName="" preserve="0" showMasterPhAnim="0" type="twoTxTwoObj" userDrawn="1">
   <p:cSld name="Comparison">
     <p:spTree>
       <p:nvGrpSpPr>
@@ -1444,8 +1445,8 @@
         </p:nvSpPr>
         <p:spPr bwMode="auto">
           <a:xfrm>
-            <a:off x="839788" y="365125"/>
-            <a:ext cx="10515600" cy="1325563"/>
+            <a:off x="839787" y="365125"/>
+            <a:ext cx="10515600" cy="1325562"/>
           </a:xfrm>
         </p:spPr>
         <p:txBody>
@@ -1475,8 +1476,8 @@
         </p:nvSpPr>
         <p:spPr bwMode="auto">
           <a:xfrm>
-            <a:off x="839788" y="1681163"/>
-            <a:ext cx="5157787" cy="823912"/>
+            <a:off x="839789" y="1681162"/>
+            <a:ext cx="5157786" cy="823911"/>
           </a:xfrm>
         </p:spPr>
         <p:txBody>
@@ -1484,39 +1485,39 @@
           <a:lstStyle>
             <a:lvl1pPr marL="0" indent="0">
               <a:buNone/>
-              <a:defRPr sz="2400" b="1"/>
+              <a:defRPr sz="1800" b="1"/>
             </a:lvl1pPr>
-            <a:lvl2pPr marL="457200" indent="0">
-              <a:buNone/>
-              <a:defRPr sz="2000" b="1"/>
+            <a:lvl2pPr marL="342900" indent="0">
+              <a:buNone/>
+              <a:defRPr sz="1500" b="1"/>
             </a:lvl2pPr>
-            <a:lvl3pPr marL="914400" indent="0">
-              <a:buNone/>
-              <a:defRPr sz="1800" b="1"/>
+            <a:lvl3pPr marL="685800" indent="0">
+              <a:buNone/>
+              <a:defRPr sz="1350" b="1"/>
             </a:lvl3pPr>
-            <a:lvl4pPr marL="1371600" indent="0">
-              <a:buNone/>
-              <a:defRPr sz="1600" b="1"/>
+            <a:lvl4pPr marL="1028700" indent="0">
+              <a:buNone/>
+              <a:defRPr sz="1200" b="1"/>
             </a:lvl4pPr>
-            <a:lvl5pPr marL="1828800" indent="0">
-              <a:buNone/>
-              <a:defRPr sz="1600" b="1"/>
+            <a:lvl5pPr marL="1371600" indent="0">
+              <a:buNone/>
+              <a:defRPr sz="1200" b="1"/>
             </a:lvl5pPr>
-            <a:lvl6pPr marL="2286000" indent="0">
-              <a:buNone/>
-              <a:defRPr sz="1600" b="1"/>
+            <a:lvl6pPr marL="1714500" indent="0">
+              <a:buNone/>
+              <a:defRPr sz="1200" b="1"/>
             </a:lvl6pPr>
-            <a:lvl7pPr marL="2743200" indent="0">
-              <a:buNone/>
-              <a:defRPr sz="1600" b="1"/>
+            <a:lvl7pPr marL="2057400" indent="0">
+              <a:buNone/>
+              <a:defRPr sz="1200" b="1"/>
             </a:lvl7pPr>
-            <a:lvl8pPr marL="3200400" indent="0">
-              <a:buNone/>
-              <a:defRPr sz="1600" b="1"/>
+            <a:lvl8pPr marL="2400300" indent="0">
+              <a:buNone/>
+              <a:defRPr sz="1200" b="1"/>
             </a:lvl8pPr>
-            <a:lvl9pPr marL="3657600" indent="0">
-              <a:buNone/>
-              <a:defRPr sz="1600" b="1"/>
+            <a:lvl9pPr marL="2743200" indent="0">
+              <a:buNone/>
+              <a:defRPr sz="1200" b="1"/>
             </a:lvl9pPr>
           </a:lstStyle>
           <a:p>
@@ -1543,8 +1544,8 @@
         </p:nvSpPr>
         <p:spPr bwMode="auto">
           <a:xfrm>
-            <a:off x="839788" y="2505074"/>
-            <a:ext cx="5157787" cy="3684588"/>
+            <a:off x="839789" y="2505074"/>
+            <a:ext cx="5157786" cy="3684587"/>
           </a:xfrm>
         </p:spPr>
         <p:txBody>
@@ -1614,8 +1615,8 @@
         </p:nvSpPr>
         <p:spPr bwMode="auto">
           <a:xfrm>
-            <a:off x="6172200" y="1681163"/>
-            <a:ext cx="5183188" cy="823912"/>
+            <a:off x="6172200" y="1681162"/>
+            <a:ext cx="5183187" cy="823911"/>
           </a:xfrm>
         </p:spPr>
         <p:txBody>
@@ -1623,39 +1624,39 @@
           <a:lstStyle>
             <a:lvl1pPr marL="0" indent="0">
               <a:buNone/>
-              <a:defRPr sz="2400" b="1"/>
+              <a:defRPr sz="1800" b="1"/>
             </a:lvl1pPr>
-            <a:lvl2pPr marL="457200" indent="0">
-              <a:buNone/>
-              <a:defRPr sz="2000" b="1"/>
+            <a:lvl2pPr marL="342900" indent="0">
+              <a:buNone/>
+              <a:defRPr sz="1500" b="1"/>
             </a:lvl2pPr>
-            <a:lvl3pPr marL="914400" indent="0">
-              <a:buNone/>
-              <a:defRPr sz="1800" b="1"/>
+            <a:lvl3pPr marL="685800" indent="0">
+              <a:buNone/>
+              <a:defRPr sz="1350" b="1"/>
             </a:lvl3pPr>
-            <a:lvl4pPr marL="1371600" indent="0">
-              <a:buNone/>
-              <a:defRPr sz="1600" b="1"/>
+            <a:lvl4pPr marL="1028700" indent="0">
+              <a:buNone/>
+              <a:defRPr sz="1200" b="1"/>
             </a:lvl4pPr>
-            <a:lvl5pPr marL="1828800" indent="0">
-              <a:buNone/>
-              <a:defRPr sz="1600" b="1"/>
+            <a:lvl5pPr marL="1371600" indent="0">
+              <a:buNone/>
+              <a:defRPr sz="1200" b="1"/>
             </a:lvl5pPr>
-            <a:lvl6pPr marL="2286000" indent="0">
-              <a:buNone/>
-              <a:defRPr sz="1600" b="1"/>
+            <a:lvl6pPr marL="1714500" indent="0">
+              <a:buNone/>
+              <a:defRPr sz="1200" b="1"/>
             </a:lvl6pPr>
-            <a:lvl7pPr marL="2743200" indent="0">
-              <a:buNone/>
-              <a:defRPr sz="1600" b="1"/>
+            <a:lvl7pPr marL="2057400" indent="0">
+              <a:buNone/>
+              <a:defRPr sz="1200" b="1"/>
             </a:lvl7pPr>
-            <a:lvl8pPr marL="3200400" indent="0">
-              <a:buNone/>
-              <a:defRPr sz="1600" b="1"/>
+            <a:lvl8pPr marL="2400300" indent="0">
+              <a:buNone/>
+              <a:defRPr sz="1200" b="1"/>
             </a:lvl8pPr>
-            <a:lvl9pPr marL="3657600" indent="0">
-              <a:buNone/>
-              <a:defRPr sz="1600" b="1"/>
+            <a:lvl9pPr marL="2743200" indent="0">
+              <a:buNone/>
+              <a:defRPr sz="1200" b="1"/>
             </a:lvl9pPr>
           </a:lstStyle>
           <a:p>
@@ -1683,7 +1684,7 @@
         <p:spPr bwMode="auto">
           <a:xfrm>
             <a:off x="6172200" y="2505074"/>
-            <a:ext cx="5183188" cy="3684588"/>
+            <a:ext cx="5183187" cy="3684587"/>
           </a:xfrm>
         </p:spPr>
         <p:txBody>
@@ -1760,10 +1761,10 @@
               <a:defRPr/>
             </a:pPr>
             <a:fld id="{BCC18F51-09EC-435C-A3BA-64A766E099C0}" type="datetimeFigureOut">
-              <a:rPr lang="en-US"/>
+              <a:rPr lang="ru-RU"/>
               <a:t/>
             </a:fld>
-            <a:endParaRPr lang="en-US"/>
+            <a:endParaRPr lang="ru-RU"/>
           </a:p>
         </p:txBody>
       </p:sp>
@@ -1785,7 +1786,7 @@
             <a:pPr>
               <a:defRPr/>
             </a:pPr>
-            <a:endParaRPr lang="en-US"/>
+            <a:endParaRPr lang="ru-RU"/>
           </a:p>
         </p:txBody>
       </p:sp>
@@ -1808,10 +1809,10 @@
               <a:defRPr/>
             </a:pPr>
             <a:fld id="{08395586-F03A-48D1-94DF-16B239DF4FB5}" type="slidenum">
-              <a:rPr lang="en-US"/>
+              <a:rPr lang="ru-RU"/>
               <a:t/>
             </a:fld>
-            <a:endParaRPr lang="en-US"/>
+            <a:endParaRPr lang="ru-RU"/>
           </a:p>
         </p:txBody>
       </p:sp>
@@ -1824,7 +1825,7 @@
 </file>
 
 <file path=ppt/slideLayouts/slideLayout6.xml><?xml version="1.0" encoding="utf-8"?>
-<p:sldLayout xmlns:a="http://schemas.openxmlformats.org/drawingml/2006/main" xmlns:r="http://schemas.openxmlformats.org/officeDocument/2006/relationships" xmlns:p="http://schemas.openxmlformats.org/presentationml/2006/main" xmlns:m="http://schemas.openxmlformats.org/officeDocument/2006/math" xmlns:w="http://schemas.openxmlformats.org/wordprocessingml/2006/main" matchingName="" preserve="1" showMasterPhAnim="0" type="titleOnly" userDrawn="1">
+<p:sldLayout xmlns:a="http://schemas.openxmlformats.org/drawingml/2006/main" xmlns:r="http://schemas.openxmlformats.org/officeDocument/2006/relationships" xmlns:p="http://schemas.openxmlformats.org/presentationml/2006/main" xmlns:m="http://schemas.openxmlformats.org/officeDocument/2006/math" xmlns:w="http://schemas.openxmlformats.org/wordprocessingml/2006/main" matchingName="" preserve="0" showMasterPhAnim="0" type="titleOnly" userDrawn="1">
   <p:cSld name="Title Only">
     <p:spTree>
       <p:nvGrpSpPr>
@@ -1885,10 +1886,10 @@
               <a:defRPr/>
             </a:pPr>
             <a:fld id="{BCC18F51-09EC-435C-A3BA-64A766E099C0}" type="datetimeFigureOut">
-              <a:rPr lang="en-US"/>
+              <a:rPr lang="ru-RU"/>
               <a:t/>
             </a:fld>
-            <a:endParaRPr lang="en-US"/>
+            <a:endParaRPr lang="ru-RU"/>
           </a:p>
         </p:txBody>
       </p:sp>
@@ -1910,7 +1911,7 @@
             <a:pPr>
               <a:defRPr/>
             </a:pPr>
-            <a:endParaRPr lang="en-US"/>
+            <a:endParaRPr lang="ru-RU"/>
           </a:p>
         </p:txBody>
       </p:sp>
@@ -1933,10 +1934,10 @@
               <a:defRPr/>
             </a:pPr>
             <a:fld id="{08395586-F03A-48D1-94DF-16B239DF4FB5}" type="slidenum">
-              <a:rPr lang="en-US"/>
+              <a:rPr lang="ru-RU"/>
               <a:t/>
             </a:fld>
-            <a:endParaRPr lang="en-US"/>
+            <a:endParaRPr lang="ru-RU"/>
           </a:p>
         </p:txBody>
       </p:sp>
@@ -1949,7 +1950,7 @@
 </file>
 
 <file path=ppt/slideLayouts/slideLayout7.xml><?xml version="1.0" encoding="utf-8"?>
-<p:sldLayout xmlns:a="http://schemas.openxmlformats.org/drawingml/2006/main" xmlns:r="http://schemas.openxmlformats.org/officeDocument/2006/relationships" xmlns:p="http://schemas.openxmlformats.org/presentationml/2006/main" xmlns:m="http://schemas.openxmlformats.org/officeDocument/2006/math" xmlns:w="http://schemas.openxmlformats.org/wordprocessingml/2006/main" matchingName="" preserve="1" showMasterPhAnim="0" type="blank" userDrawn="1">
+<p:sldLayout xmlns:a="http://schemas.openxmlformats.org/drawingml/2006/main" xmlns:r="http://schemas.openxmlformats.org/officeDocument/2006/relationships" xmlns:p="http://schemas.openxmlformats.org/presentationml/2006/main" xmlns:m="http://schemas.openxmlformats.org/officeDocument/2006/math" xmlns:w="http://schemas.openxmlformats.org/wordprocessingml/2006/main" matchingName="" preserve="0" showMasterPhAnim="0" type="blank" userDrawn="1">
   <p:cSld name="Blank">
     <p:spTree>
       <p:nvGrpSpPr>
@@ -1984,10 +1985,10 @@
               <a:defRPr/>
             </a:pPr>
             <a:fld id="{BCC18F51-09EC-435C-A3BA-64A766E099C0}" type="datetimeFigureOut">
-              <a:rPr lang="en-US"/>
+              <a:rPr lang="ru-RU"/>
               <a:t/>
             </a:fld>
-            <a:endParaRPr lang="en-US"/>
+            <a:endParaRPr lang="ru-RU"/>
           </a:p>
         </p:txBody>
       </p:sp>
@@ -2009,7 +2010,7 @@
             <a:pPr>
               <a:defRPr/>
             </a:pPr>
-            <a:endParaRPr lang="en-US"/>
+            <a:endParaRPr lang="ru-RU"/>
           </a:p>
         </p:txBody>
       </p:sp>
@@ -2032,10 +2033,10 @@
               <a:defRPr/>
             </a:pPr>
             <a:fld id="{08395586-F03A-48D1-94DF-16B239DF4FB5}" type="slidenum">
-              <a:rPr lang="en-US"/>
+              <a:rPr lang="ru-RU"/>
               <a:t/>
             </a:fld>
-            <a:endParaRPr lang="en-US"/>
+            <a:endParaRPr lang="ru-RU"/>
           </a:p>
         </p:txBody>
       </p:sp>
@@ -2048,7 +2049,7 @@
 </file>
 
 <file path=ppt/slideLayouts/slideLayout8.xml><?xml version="1.0" encoding="utf-8"?>
-<p:sldLayout xmlns:a="http://schemas.openxmlformats.org/drawingml/2006/main" xmlns:r="http://schemas.openxmlformats.org/officeDocument/2006/relationships" xmlns:p="http://schemas.openxmlformats.org/presentationml/2006/main" xmlns:m="http://schemas.openxmlformats.org/officeDocument/2006/math" xmlns:w="http://schemas.openxmlformats.org/wordprocessingml/2006/main" matchingName="" preserve="1" showMasterPhAnim="0" type="objTx" userDrawn="1">
+<p:sldLayout xmlns:a="http://schemas.openxmlformats.org/drawingml/2006/main" xmlns:r="http://schemas.openxmlformats.org/officeDocument/2006/relationships" xmlns:p="http://schemas.openxmlformats.org/presentationml/2006/main" xmlns:m="http://schemas.openxmlformats.org/officeDocument/2006/math" xmlns:w="http://schemas.openxmlformats.org/wordprocessingml/2006/main" matchingName="" preserve="0" showMasterPhAnim="0" type="objTx" userDrawn="1">
   <p:cSld name="Content with Caption">
     <p:spTree>
       <p:nvGrpSpPr>
@@ -2076,7 +2077,7 @@
         </p:nvSpPr>
         <p:spPr bwMode="auto">
           <a:xfrm>
-            <a:off x="839788" y="457200"/>
+            <a:off x="839787" y="457200"/>
             <a:ext cx="3932237" cy="1600200"/>
           </a:xfrm>
         </p:spPr>
@@ -2084,7 +2085,7 @@
           <a:bodyPr anchor="b"/>
           <a:lstStyle>
             <a:lvl1pPr>
-              <a:defRPr sz="3200"/>
+              <a:defRPr sz="2400"/>
             </a:lvl1pPr>
           </a:lstStyle>
           <a:p>
@@ -2111,7 +2112,7 @@
         </p:nvSpPr>
         <p:spPr bwMode="auto">
           <a:xfrm>
-            <a:off x="5183188" y="987425"/>
+            <a:off x="5183187" y="987425"/>
             <a:ext cx="6172200" cy="4873625"/>
           </a:xfrm>
         </p:spPr>
@@ -2119,31 +2120,31 @@
           <a:bodyPr/>
           <a:lstStyle>
             <a:lvl1pPr>
-              <a:defRPr sz="3200"/>
+              <a:defRPr sz="2400"/>
             </a:lvl1pPr>
             <a:lvl2pPr>
-              <a:defRPr sz="2800"/>
+              <a:defRPr sz="2100"/>
             </a:lvl2pPr>
             <a:lvl3pPr>
-              <a:defRPr sz="2400"/>
+              <a:defRPr sz="1800"/>
             </a:lvl3pPr>
             <a:lvl4pPr>
-              <a:defRPr sz="2000"/>
+              <a:defRPr sz="1500"/>
             </a:lvl4pPr>
             <a:lvl5pPr>
-              <a:defRPr sz="2000"/>
+              <a:defRPr sz="1500"/>
             </a:lvl5pPr>
             <a:lvl6pPr>
-              <a:defRPr sz="2000"/>
+              <a:defRPr sz="1500"/>
             </a:lvl6pPr>
             <a:lvl7pPr>
-              <a:defRPr sz="2000"/>
+              <a:defRPr sz="1500"/>
             </a:lvl7pPr>
             <a:lvl8pPr>
-              <a:defRPr sz="2000"/>
+              <a:defRPr sz="1500"/>
             </a:lvl8pPr>
             <a:lvl9pPr>
-              <a:defRPr sz="2000"/>
+              <a:defRPr sz="1500"/>
             </a:lvl9pPr>
           </a:lstStyle>
           <a:p>
@@ -2210,8 +2211,8 @@
         </p:nvSpPr>
         <p:spPr bwMode="auto">
           <a:xfrm>
-            <a:off x="839788" y="2057400"/>
-            <a:ext cx="3932237" cy="3811588"/>
+            <a:off x="839787" y="2057399"/>
+            <a:ext cx="3932237" cy="3811587"/>
           </a:xfrm>
         </p:spPr>
         <p:txBody>
@@ -2219,39 +2220,39 @@
           <a:lstStyle>
             <a:lvl1pPr marL="0" indent="0">
               <a:buNone/>
-              <a:defRPr sz="1600"/>
+              <a:defRPr sz="1200"/>
             </a:lvl1pPr>
-            <a:lvl2pPr marL="457200" indent="0">
-              <a:buNone/>
-              <a:defRPr sz="1400"/>
+            <a:lvl2pPr marL="342900" indent="0">
+              <a:buNone/>
+              <a:defRPr sz="1050"/>
             </a:lvl2pPr>
-            <a:lvl3pPr marL="914400" indent="0">
-              <a:buNone/>
-              <a:defRPr sz="1200"/>
+            <a:lvl3pPr marL="685800" indent="0">
+              <a:buNone/>
+              <a:defRPr sz="900"/>
             </a:lvl3pPr>
-            <a:lvl4pPr marL="1371600" indent="0">
-              <a:buNone/>
-              <a:defRPr sz="1000"/>
+            <a:lvl4pPr marL="1028700" indent="0">
+              <a:buNone/>
+              <a:defRPr sz="750"/>
             </a:lvl4pPr>
-            <a:lvl5pPr marL="1828800" indent="0">
-              <a:buNone/>
-              <a:defRPr sz="1000"/>
+            <a:lvl5pPr marL="1371600" indent="0">
+              <a:buNone/>
+              <a:defRPr sz="750"/>
             </a:lvl5pPr>
-            <a:lvl6pPr marL="2286000" indent="0">
-              <a:buNone/>
-              <a:defRPr sz="1000"/>
+            <a:lvl6pPr marL="1714500" indent="0">
+              <a:buNone/>
+              <a:defRPr sz="750"/>
             </a:lvl6pPr>
-            <a:lvl7pPr marL="2743200" indent="0">
-              <a:buNone/>
-              <a:defRPr sz="1000"/>
+            <a:lvl7pPr marL="2057400" indent="0">
+              <a:buNone/>
+              <a:defRPr sz="750"/>
             </a:lvl7pPr>
-            <a:lvl8pPr marL="3200400" indent="0">
-              <a:buNone/>
-              <a:defRPr sz="1000"/>
+            <a:lvl8pPr marL="2400300" indent="0">
+              <a:buNone/>
+              <a:defRPr sz="750"/>
             </a:lvl8pPr>
-            <a:lvl9pPr marL="3657600" indent="0">
-              <a:buNone/>
-              <a:defRPr sz="1000"/>
+            <a:lvl9pPr marL="2743200" indent="0">
+              <a:buNone/>
+              <a:defRPr sz="750"/>
             </a:lvl9pPr>
           </a:lstStyle>
           <a:p>
@@ -2285,10 +2286,10 @@
               <a:defRPr/>
             </a:pPr>
             <a:fld id="{BCC18F51-09EC-435C-A3BA-64A766E099C0}" type="datetimeFigureOut">
-              <a:rPr lang="en-US"/>
+              <a:rPr lang="ru-RU"/>
               <a:t/>
             </a:fld>
-            <a:endParaRPr lang="en-US"/>
+            <a:endParaRPr lang="ru-RU"/>
           </a:p>
         </p:txBody>
       </p:sp>
@@ -2310,7 +2311,7 @@
             <a:pPr>
               <a:defRPr/>
             </a:pPr>
-            <a:endParaRPr lang="en-US"/>
+            <a:endParaRPr lang="ru-RU"/>
           </a:p>
         </p:txBody>
       </p:sp>
@@ -2333,10 +2334,10 @@
               <a:defRPr/>
             </a:pPr>
             <a:fld id="{08395586-F03A-48D1-94DF-16B239DF4FB5}" type="slidenum">
-              <a:rPr lang="en-US"/>
+              <a:rPr lang="ru-RU"/>
               <a:t/>
             </a:fld>
-            <a:endParaRPr lang="en-US"/>
+            <a:endParaRPr lang="ru-RU"/>
           </a:p>
         </p:txBody>
       </p:sp>
@@ -2349,7 +2350,7 @@
 </file>
 
 <file path=ppt/slideLayouts/slideLayout9.xml><?xml version="1.0" encoding="utf-8"?>
-<p:sldLayout xmlns:a="http://schemas.openxmlformats.org/drawingml/2006/main" xmlns:r="http://schemas.openxmlformats.org/officeDocument/2006/relationships" xmlns:p="http://schemas.openxmlformats.org/presentationml/2006/main" xmlns:m="http://schemas.openxmlformats.org/officeDocument/2006/math" xmlns:w="http://schemas.openxmlformats.org/wordprocessingml/2006/main" matchingName="" preserve="1" showMasterPhAnim="0" type="picTx" userDrawn="1">
+<p:sldLayout xmlns:a="http://schemas.openxmlformats.org/drawingml/2006/main" xmlns:r="http://schemas.openxmlformats.org/officeDocument/2006/relationships" xmlns:p="http://schemas.openxmlformats.org/presentationml/2006/main" xmlns:m="http://schemas.openxmlformats.org/officeDocument/2006/math" xmlns:w="http://schemas.openxmlformats.org/wordprocessingml/2006/main" matchingName="" preserve="0" showMasterPhAnim="0" type="picTx" userDrawn="1">
   <p:cSld name="Picture with Caption">
     <p:spTree>
       <p:nvGrpSpPr>
@@ -2377,7 +2378,7 @@
         </p:nvSpPr>
         <p:spPr bwMode="auto">
           <a:xfrm>
-            <a:off x="839788" y="457200"/>
+            <a:off x="839787" y="457200"/>
             <a:ext cx="3932237" cy="1600200"/>
           </a:xfrm>
         </p:spPr>
@@ -2385,7 +2386,7 @@
           <a:bodyPr anchor="b"/>
           <a:lstStyle>
             <a:lvl1pPr>
-              <a:defRPr sz="3200"/>
+              <a:defRPr sz="2400"/>
             </a:lvl1pPr>
           </a:lstStyle>
           <a:p>
@@ -2412,7 +2413,7 @@
         </p:nvSpPr>
         <p:spPr bwMode="auto">
           <a:xfrm>
-            <a:off x="5183188" y="987425"/>
+            <a:off x="5183187" y="987425"/>
             <a:ext cx="6172200" cy="4873625"/>
           </a:xfrm>
         </p:spPr>
@@ -2421,39 +2422,39 @@
           <a:lstStyle>
             <a:lvl1pPr marL="0" indent="0">
               <a:buNone/>
-              <a:defRPr sz="3200"/>
+              <a:defRPr sz="2400"/>
             </a:lvl1pPr>
-            <a:lvl2pPr marL="457200" indent="0">
-              <a:buNone/>
-              <a:defRPr sz="2800"/>
+            <a:lvl2pPr marL="342900" indent="0">
+              <a:buNone/>
+              <a:defRPr sz="2100"/>
             </a:lvl2pPr>
-            <a:lvl3pPr marL="914400" indent="0">
-              <a:buNone/>
-              <a:defRPr sz="2400"/>
+            <a:lvl3pPr marL="685800" indent="0">
+              <a:buNone/>
+              <a:defRPr sz="1800"/>
             </a:lvl3pPr>
-            <a:lvl4pPr marL="1371600" indent="0">
-              <a:buNone/>
-              <a:defRPr sz="2000"/>
+            <a:lvl4pPr marL="1028700" indent="0">
+              <a:buNone/>
+              <a:defRPr sz="1500"/>
             </a:lvl4pPr>
-            <a:lvl5pPr marL="1828800" indent="0">
-              <a:buNone/>
-              <a:defRPr sz="2000"/>
+            <a:lvl5pPr marL="1371600" indent="0">
+              <a:buNone/>
+              <a:defRPr sz="1500"/>
             </a:lvl5pPr>
-            <a:lvl6pPr marL="2286000" indent="0">
-              <a:buNone/>
-              <a:defRPr sz="2000"/>
+            <a:lvl6pPr marL="1714500" indent="0">
+              <a:buNone/>
+              <a:defRPr sz="1500"/>
             </a:lvl6pPr>
-            <a:lvl7pPr marL="2743200" indent="0">
-              <a:buNone/>
-              <a:defRPr sz="2000"/>
+            <a:lvl7pPr marL="2057400" indent="0">
+              <a:buNone/>
+              <a:defRPr sz="1500"/>
             </a:lvl7pPr>
-            <a:lvl8pPr marL="3200400" indent="0">
-              <a:buNone/>
-              <a:defRPr sz="2000"/>
+            <a:lvl8pPr marL="2400300" indent="0">
+              <a:buNone/>
+              <a:defRPr sz="1500"/>
             </a:lvl8pPr>
-            <a:lvl9pPr marL="3657600" indent="0">
-              <a:buNone/>
-              <a:defRPr sz="2000"/>
+            <a:lvl9pPr marL="2743200" indent="0">
+              <a:buNone/>
+              <a:defRPr sz="1500"/>
             </a:lvl9pPr>
           </a:lstStyle>
           <a:p>
@@ -2480,8 +2481,8 @@
         </p:nvSpPr>
         <p:spPr bwMode="auto">
           <a:xfrm>
-            <a:off x="839788" y="2057400"/>
-            <a:ext cx="3932237" cy="3811588"/>
+            <a:off x="839787" y="2057399"/>
+            <a:ext cx="3932237" cy="3811587"/>
           </a:xfrm>
         </p:spPr>
         <p:txBody>
@@ -2489,39 +2490,39 @@
           <a:lstStyle>
             <a:lvl1pPr marL="0" indent="0">
               <a:buNone/>
-              <a:defRPr sz="1600"/>
+              <a:defRPr sz="1200"/>
             </a:lvl1pPr>
-            <a:lvl2pPr marL="457200" indent="0">
-              <a:buNone/>
-              <a:defRPr sz="1400"/>
+            <a:lvl2pPr marL="342900" indent="0">
+              <a:buNone/>
+              <a:defRPr sz="1050"/>
             </a:lvl2pPr>
-            <a:lvl3pPr marL="914400" indent="0">
-              <a:buNone/>
-              <a:defRPr sz="1200"/>
+            <a:lvl3pPr marL="685800" indent="0">
+              <a:buNone/>
+              <a:defRPr sz="900"/>
             </a:lvl3pPr>
-            <a:lvl4pPr marL="1371600" indent="0">
-              <a:buNone/>
-              <a:defRPr sz="1000"/>
+            <a:lvl4pPr marL="1028700" indent="0">
+              <a:buNone/>
+              <a:defRPr sz="750"/>
             </a:lvl4pPr>
-            <a:lvl5pPr marL="1828800" indent="0">
-              <a:buNone/>
-              <a:defRPr sz="1000"/>
+            <a:lvl5pPr marL="1371600" indent="0">
+              <a:buNone/>
+              <a:defRPr sz="750"/>
             </a:lvl5pPr>
-            <a:lvl6pPr marL="2286000" indent="0">
-              <a:buNone/>
-              <a:defRPr sz="1000"/>
+            <a:lvl6pPr marL="1714500" indent="0">
+              <a:buNone/>
+              <a:defRPr sz="750"/>
             </a:lvl6pPr>
-            <a:lvl7pPr marL="2743200" indent="0">
-              <a:buNone/>
-              <a:defRPr sz="1000"/>
+            <a:lvl7pPr marL="2057400" indent="0">
+              <a:buNone/>
+              <a:defRPr sz="750"/>
             </a:lvl7pPr>
-            <a:lvl8pPr marL="3200400" indent="0">
-              <a:buNone/>
-              <a:defRPr sz="1000"/>
+            <a:lvl8pPr marL="2400300" indent="0">
+              <a:buNone/>
+              <a:defRPr sz="750"/>
             </a:lvl8pPr>
-            <a:lvl9pPr marL="3657600" indent="0">
-              <a:buNone/>
-              <a:defRPr sz="1000"/>
+            <a:lvl9pPr marL="2743200" indent="0">
+              <a:buNone/>
+              <a:defRPr sz="750"/>
             </a:lvl9pPr>
           </a:lstStyle>
           <a:p>
@@ -2555,10 +2556,10 @@
               <a:defRPr/>
             </a:pPr>
             <a:fld id="{BCC18F51-09EC-435C-A3BA-64A766E099C0}" type="datetimeFigureOut">
-              <a:rPr lang="en-US"/>
+              <a:rPr lang="ru-RU"/>
               <a:t/>
             </a:fld>
-            <a:endParaRPr lang="en-US"/>
+            <a:endParaRPr lang="ru-RU"/>
           </a:p>
         </p:txBody>
       </p:sp>
@@ -2580,7 +2581,7 @@
             <a:pPr>
               <a:defRPr/>
             </a:pPr>
-            <a:endParaRPr lang="en-US"/>
+            <a:endParaRPr lang="ru-RU"/>
           </a:p>
         </p:txBody>
       </p:sp>
@@ -2603,10 +2604,10 @@
               <a:defRPr/>
             </a:pPr>
             <a:fld id="{08395586-F03A-48D1-94DF-16B239DF4FB5}" type="slidenum">
-              <a:rPr lang="en-US"/>
+              <a:rPr lang="ru-RU"/>
               <a:t/>
             </a:fld>
-            <a:endParaRPr lang="en-US"/>
+            <a:endParaRPr lang="ru-RU"/>
           </a:p>
         </p:txBody>
       </p:sp>
@@ -2652,8 +2653,8 @@
         </p:nvSpPr>
         <p:spPr bwMode="auto">
           <a:xfrm>
-            <a:off x="838200" y="365125"/>
-            <a:ext cx="10515600" cy="1325563"/>
+            <a:off x="838199" y="365125"/>
+            <a:ext cx="10515600" cy="1325562"/>
           </a:xfrm>
           <a:prstGeom prst="rect">
             <a:avLst/>
@@ -2688,7 +2689,7 @@
         </p:nvSpPr>
         <p:spPr bwMode="auto">
           <a:xfrm>
-            <a:off x="838200" y="1825625"/>
+            <a:off x="838199" y="1825625"/>
             <a:ext cx="10515600" cy="4351338"/>
           </a:xfrm>
           <a:prstGeom prst="rect">
@@ -2764,7 +2765,7 @@
         </p:nvSpPr>
         <p:spPr bwMode="auto">
           <a:xfrm>
-            <a:off x="838200" y="6356350"/>
+            <a:off x="838199" y="6356350"/>
             <a:ext cx="2743200" cy="365125"/>
           </a:xfrm>
           <a:prstGeom prst="rect">
@@ -2775,7 +2776,7 @@
           <a:bodyPr vert="horz" lIns="91440" tIns="45720" rIns="91440" bIns="45720" rtlCol="0" anchor="ctr"/>
           <a:lstStyle>
             <a:lvl1pPr algn="l">
-              <a:defRPr sz="1200">
+              <a:defRPr sz="900">
                 <a:solidFill>
                   <a:schemeClr val="tx1">
                     <a:tint val="75000"/>
@@ -2789,10 +2790,10 @@
               <a:defRPr/>
             </a:pPr>
             <a:fld id="{BCC18F51-09EC-435C-A3BA-64A766E099C0}" type="datetimeFigureOut">
-              <a:rPr lang="en-US"/>
+              <a:rPr lang="ru-RU"/>
               <a:t/>
             </a:fld>
-            <a:endParaRPr lang="en-US"/>
+            <a:endParaRPr lang="ru-RU"/>
           </a:p>
         </p:txBody>
       </p:sp>
@@ -2808,7 +2809,7 @@
         </p:nvSpPr>
         <p:spPr bwMode="auto">
           <a:xfrm>
-            <a:off x="4038600" y="6356350"/>
+            <a:off x="4038599" y="6356350"/>
             <a:ext cx="4114800" cy="365125"/>
           </a:xfrm>
           <a:prstGeom prst="rect">
@@ -2819,7 +2820,7 @@
           <a:bodyPr vert="horz" lIns="91440" tIns="45720" rIns="91440" bIns="45720" rtlCol="0" anchor="ctr"/>
           <a:lstStyle>
             <a:lvl1pPr algn="ctr">
-              <a:defRPr sz="1200">
+              <a:defRPr sz="900">
                 <a:solidFill>
                   <a:schemeClr val="tx1">
                     <a:tint val="75000"/>
@@ -2832,7 +2833,7 @@
             <a:pPr>
               <a:defRPr/>
             </a:pPr>
-            <a:endParaRPr lang="en-US"/>
+            <a:endParaRPr lang="ru-RU"/>
           </a:p>
         </p:txBody>
       </p:sp>
@@ -2848,7 +2849,7 @@
         </p:nvSpPr>
         <p:spPr bwMode="auto">
           <a:xfrm>
-            <a:off x="8610600" y="6356350"/>
+            <a:off x="8610599" y="6356350"/>
             <a:ext cx="2743200" cy="365125"/>
           </a:xfrm>
           <a:prstGeom prst="rect">
@@ -2859,7 +2860,7 @@
           <a:bodyPr vert="horz" lIns="91440" tIns="45720" rIns="91440" bIns="45720" rtlCol="0" anchor="ctr"/>
           <a:lstStyle>
             <a:lvl1pPr algn="r">
-              <a:defRPr sz="1200">
+              <a:defRPr sz="900">
                 <a:solidFill>
                   <a:schemeClr val="tx1">
                     <a:tint val="75000"/>
@@ -2873,10 +2874,10 @@
               <a:defRPr/>
             </a:pPr>
             <a:fld id="{08395586-F03A-48D1-94DF-16B239DF4FB5}" type="slidenum">
-              <a:rPr lang="en-US"/>
+              <a:rPr lang="ru-RU"/>
               <a:t/>
             </a:fld>
-            <a:endParaRPr lang="en-US"/>
+            <a:endParaRPr lang="ru-RU"/>
           </a:p>
         </p:txBody>
       </p:sp>
@@ -2898,7 +2899,7 @@
   </p:sldLayoutIdLst>
   <p:txStyles>
     <p:titleStyle>
-      <a:lvl1pPr algn="l" defTabSz="914400">
+      <a:lvl1pPr algn="l" defTabSz="685800">
         <a:lnSpc>
           <a:spcPct val="90000"/>
         </a:lnSpc>
@@ -2906,7 +2907,7 @@
           <a:spcPts val="0"/>
         </a:spcBef>
         <a:buNone/>
-        <a:defRPr sz="4400">
+        <a:defRPr sz="3300">
           <a:solidFill>
             <a:schemeClr val="tx1"/>
           </a:solidFill>
@@ -2917,16 +2918,16 @@
       </a:lvl1pPr>
     </p:titleStyle>
     <p:bodyStyle>
-      <a:lvl1pPr marL="228600" indent="-228600" algn="l" defTabSz="914400">
+      <a:lvl1pPr marL="171450" indent="-171450" algn="l" defTabSz="685800">
         <a:lnSpc>
           <a:spcPct val="90000"/>
         </a:lnSpc>
         <a:spcBef>
-          <a:spcPts val="1000"/>
+          <a:spcPts val="749"/>
         </a:spcBef>
         <a:buFont typeface="Arial"/>
         <a:buChar char="•"/>
-        <a:defRPr sz="2800">
+        <a:defRPr sz="2100">
           <a:solidFill>
             <a:schemeClr val="tx1"/>
           </a:solidFill>
@@ -2935,48 +2936,12 @@
           <a:cs typeface="+mn-cs"/>
         </a:defRPr>
       </a:lvl1pPr>
-      <a:lvl2pPr marL="685800" indent="-228600" algn="l" defTabSz="914400">
+      <a:lvl2pPr marL="514350" indent="-171450" algn="l" defTabSz="685800">
         <a:lnSpc>
           <a:spcPct val="90000"/>
         </a:lnSpc>
         <a:spcBef>
-          <a:spcPts val="500"/>
-        </a:spcBef>
-        <a:buFont typeface="Arial"/>
-        <a:buChar char="•"/>
-        <a:defRPr sz="2400">
-          <a:solidFill>
-            <a:schemeClr val="tx1"/>
-          </a:solidFill>
-          <a:latin typeface="+mn-lt"/>
-          <a:ea typeface="+mn-ea"/>
-          <a:cs typeface="+mn-cs"/>
-        </a:defRPr>
-      </a:lvl2pPr>
-      <a:lvl3pPr marL="1143000" indent="-228600" algn="l" defTabSz="914400">
-        <a:lnSpc>
-          <a:spcPct val="90000"/>
-        </a:lnSpc>
-        <a:spcBef>
-          <a:spcPts val="500"/>
-        </a:spcBef>
-        <a:buFont typeface="Arial"/>
-        <a:buChar char="•"/>
-        <a:defRPr sz="2000">
-          <a:solidFill>
-            <a:schemeClr val="tx1"/>
-          </a:solidFill>
-          <a:latin typeface="+mn-lt"/>
-          <a:ea typeface="+mn-ea"/>
-          <a:cs typeface="+mn-cs"/>
-        </a:defRPr>
-      </a:lvl3pPr>
-      <a:lvl4pPr marL="1600200" indent="-228600" algn="l" defTabSz="914400">
-        <a:lnSpc>
-          <a:spcPct val="90000"/>
-        </a:lnSpc>
-        <a:spcBef>
-          <a:spcPts val="500"/>
+          <a:spcPts val="374"/>
         </a:spcBef>
         <a:buFont typeface="Arial"/>
         <a:buChar char="•"/>
@@ -2988,17 +2953,53 @@
           <a:ea typeface="+mn-ea"/>
           <a:cs typeface="+mn-cs"/>
         </a:defRPr>
-      </a:lvl4pPr>
-      <a:lvl5pPr marL="2057400" indent="-228600" algn="l" defTabSz="914400">
+      </a:lvl2pPr>
+      <a:lvl3pPr marL="857250" indent="-171450" algn="l" defTabSz="685800">
         <a:lnSpc>
           <a:spcPct val="90000"/>
         </a:lnSpc>
         <a:spcBef>
-          <a:spcPts val="500"/>
+          <a:spcPts val="374"/>
         </a:spcBef>
         <a:buFont typeface="Arial"/>
         <a:buChar char="•"/>
-        <a:defRPr sz="1800">
+        <a:defRPr sz="1500">
+          <a:solidFill>
+            <a:schemeClr val="tx1"/>
+          </a:solidFill>
+          <a:latin typeface="+mn-lt"/>
+          <a:ea typeface="+mn-ea"/>
+          <a:cs typeface="+mn-cs"/>
+        </a:defRPr>
+      </a:lvl3pPr>
+      <a:lvl4pPr marL="1200150" indent="-171450" algn="l" defTabSz="685800">
+        <a:lnSpc>
+          <a:spcPct val="90000"/>
+        </a:lnSpc>
+        <a:spcBef>
+          <a:spcPts val="374"/>
+        </a:spcBef>
+        <a:buFont typeface="Arial"/>
+        <a:buChar char="•"/>
+        <a:defRPr sz="1350">
+          <a:solidFill>
+            <a:schemeClr val="tx1"/>
+          </a:solidFill>
+          <a:latin typeface="+mn-lt"/>
+          <a:ea typeface="+mn-ea"/>
+          <a:cs typeface="+mn-cs"/>
+        </a:defRPr>
+      </a:lvl4pPr>
+      <a:lvl5pPr marL="1543050" indent="-171450" algn="l" defTabSz="685800">
+        <a:lnSpc>
+          <a:spcPct val="90000"/>
+        </a:lnSpc>
+        <a:spcBef>
+          <a:spcPts val="374"/>
+        </a:spcBef>
+        <a:buFont typeface="Arial"/>
+        <a:buChar char="•"/>
+        <a:defRPr sz="1350">
           <a:solidFill>
             <a:schemeClr val="tx1"/>
           </a:solidFill>
@@ -3007,16 +3008,16 @@
           <a:cs typeface="+mn-cs"/>
         </a:defRPr>
       </a:lvl5pPr>
-      <a:lvl6pPr marL="2514600" indent="-228600" algn="l" defTabSz="914400">
+      <a:lvl6pPr marL="1885950" indent="-171450" algn="l" defTabSz="685800">
         <a:lnSpc>
           <a:spcPct val="90000"/>
         </a:lnSpc>
         <a:spcBef>
-          <a:spcPts val="500"/>
+          <a:spcPts val="374"/>
         </a:spcBef>
         <a:buFont typeface="Arial"/>
         <a:buChar char="•"/>
-        <a:defRPr sz="1800">
+        <a:defRPr sz="1350">
           <a:solidFill>
             <a:schemeClr val="tx1"/>
           </a:solidFill>
@@ -3025,16 +3026,16 @@
           <a:cs typeface="+mn-cs"/>
         </a:defRPr>
       </a:lvl6pPr>
-      <a:lvl7pPr marL="2971800" indent="-228600" algn="l" defTabSz="914400">
+      <a:lvl7pPr marL="2228850" indent="-171450" algn="l" defTabSz="685800">
         <a:lnSpc>
           <a:spcPct val="90000"/>
         </a:lnSpc>
         <a:spcBef>
-          <a:spcPts val="500"/>
+          <a:spcPts val="374"/>
         </a:spcBef>
         <a:buFont typeface="Arial"/>
         <a:buChar char="•"/>
-        <a:defRPr sz="1800">
+        <a:defRPr sz="1350">
           <a:solidFill>
             <a:schemeClr val="tx1"/>
           </a:solidFill>
@@ -3043,16 +3044,16 @@
           <a:cs typeface="+mn-cs"/>
         </a:defRPr>
       </a:lvl7pPr>
-      <a:lvl8pPr marL="3429000" indent="-228600" algn="l" defTabSz="914400">
+      <a:lvl8pPr marL="2571750" indent="-171450" algn="l" defTabSz="685800">
         <a:lnSpc>
           <a:spcPct val="90000"/>
         </a:lnSpc>
         <a:spcBef>
-          <a:spcPts val="500"/>
+          <a:spcPts val="374"/>
         </a:spcBef>
         <a:buFont typeface="Arial"/>
         <a:buChar char="•"/>
-        <a:defRPr sz="1800">
+        <a:defRPr sz="1350">
           <a:solidFill>
             <a:schemeClr val="tx1"/>
           </a:solidFill>
@@ -3061,16 +3062,16 @@
           <a:cs typeface="+mn-cs"/>
         </a:defRPr>
       </a:lvl8pPr>
-      <a:lvl9pPr marL="3886200" indent="-228600" algn="l" defTabSz="914400">
+      <a:lvl9pPr marL="2914650" indent="-171450" algn="l" defTabSz="685800">
         <a:lnSpc>
           <a:spcPct val="90000"/>
         </a:lnSpc>
         <a:spcBef>
-          <a:spcPts val="500"/>
+          <a:spcPts val="374"/>
         </a:spcBef>
         <a:buFont typeface="Arial"/>
         <a:buChar char="•"/>
-        <a:defRPr sz="1800">
+        <a:defRPr sz="1350">
           <a:solidFill>
             <a:schemeClr val="tx1"/>
           </a:solidFill>
@@ -3084,8 +3085,8 @@
       <a:defPPr>
         <a:defRPr lang="en-US"/>
       </a:defPPr>
-      <a:lvl1pPr marL="0" algn="l" defTabSz="914400">
-        <a:defRPr sz="1800">
+      <a:lvl1pPr marL="0" algn="l" defTabSz="685800">
+        <a:defRPr sz="1350">
           <a:solidFill>
             <a:schemeClr val="tx1"/>
           </a:solidFill>
@@ -3094,8 +3095,8 @@
           <a:cs typeface="+mn-cs"/>
         </a:defRPr>
       </a:lvl1pPr>
-      <a:lvl2pPr marL="457200" algn="l" defTabSz="914400">
-        <a:defRPr sz="1800">
+      <a:lvl2pPr marL="342900" algn="l" defTabSz="685800">
+        <a:defRPr sz="1350">
           <a:solidFill>
             <a:schemeClr val="tx1"/>
           </a:solidFill>
@@ -3104,8 +3105,8 @@
           <a:cs typeface="+mn-cs"/>
         </a:defRPr>
       </a:lvl2pPr>
-      <a:lvl3pPr marL="914400" algn="l" defTabSz="914400">
-        <a:defRPr sz="1800">
+      <a:lvl3pPr marL="685800" algn="l" defTabSz="685800">
+        <a:defRPr sz="1350">
           <a:solidFill>
             <a:schemeClr val="tx1"/>
           </a:solidFill>
@@ -3114,8 +3115,8 @@
           <a:cs typeface="+mn-cs"/>
         </a:defRPr>
       </a:lvl3pPr>
-      <a:lvl4pPr marL="1371600" algn="l" defTabSz="914400">
-        <a:defRPr sz="1800">
+      <a:lvl4pPr marL="1028700" algn="l" defTabSz="685800">
+        <a:defRPr sz="1350">
           <a:solidFill>
             <a:schemeClr val="tx1"/>
           </a:solidFill>
@@ -3124,8 +3125,8 @@
           <a:cs typeface="+mn-cs"/>
         </a:defRPr>
       </a:lvl4pPr>
-      <a:lvl5pPr marL="1828800" algn="l" defTabSz="914400">
-        <a:defRPr sz="1800">
+      <a:lvl5pPr marL="1371600" algn="l" defTabSz="685800">
+        <a:defRPr sz="1350">
           <a:solidFill>
             <a:schemeClr val="tx1"/>
           </a:solidFill>
@@ -3134,8 +3135,8 @@
           <a:cs typeface="+mn-cs"/>
         </a:defRPr>
       </a:lvl5pPr>
-      <a:lvl6pPr marL="2286000" algn="l" defTabSz="914400">
-        <a:defRPr sz="1800">
+      <a:lvl6pPr marL="1714500" algn="l" defTabSz="685800">
+        <a:defRPr sz="1350">
           <a:solidFill>
             <a:schemeClr val="tx1"/>
           </a:solidFill>
@@ -3144,8 +3145,8 @@
           <a:cs typeface="+mn-cs"/>
         </a:defRPr>
       </a:lvl6pPr>
-      <a:lvl7pPr marL="2743200" algn="l" defTabSz="914400">
-        <a:defRPr sz="1800">
+      <a:lvl7pPr marL="2057400" algn="l" defTabSz="685800">
+        <a:defRPr sz="1350">
           <a:solidFill>
             <a:schemeClr val="tx1"/>
           </a:solidFill>
@@ -3154,8 +3155,8 @@
           <a:cs typeface="+mn-cs"/>
         </a:defRPr>
       </a:lvl7pPr>
-      <a:lvl8pPr marL="3200400" algn="l" defTabSz="914400">
-        <a:defRPr sz="1800">
+      <a:lvl8pPr marL="2400300" algn="l" defTabSz="685800">
+        <a:defRPr sz="1350">
           <a:solidFill>
             <a:schemeClr val="tx1"/>
           </a:solidFill>
@@ -3164,8 +3165,8 @@
           <a:cs typeface="+mn-cs"/>
         </a:defRPr>
       </a:lvl8pPr>
-      <a:lvl9pPr marL="3657600" algn="l" defTabSz="914400">
-        <a:defRPr sz="1800">
+      <a:lvl9pPr marL="2743200" algn="l" defTabSz="685800">
+        <a:defRPr sz="1350">
           <a:solidFill>
             <a:schemeClr val="tx1"/>
           </a:solidFill>
@@ -3182,6 +3183,13 @@
 <file path=ppt/slides/slide1.xml><?xml version="1.0" encoding="utf-8"?>
 <p:sld xmlns:a="http://schemas.openxmlformats.org/drawingml/2006/main" xmlns:r="http://schemas.openxmlformats.org/officeDocument/2006/relationships" xmlns:p="http://schemas.openxmlformats.org/presentationml/2006/main" xmlns:m="http://schemas.openxmlformats.org/officeDocument/2006/math" xmlns:w="http://schemas.openxmlformats.org/wordprocessingml/2006/main" showMasterPhAnim="0" show="1">
   <p:cSld name="">
+    <p:bg>
+      <p:bgPr shadeToTitle="0">
+        <a:solidFill>
+          <a:schemeClr val="accent1"/>
+        </a:solidFill>
+      </p:bgPr>
+    </p:bg>
     <p:spTree>
       <p:nvGrpSpPr>
         <p:cNvPr id="1" name="" hidden="0"/>
@@ -3204,8 +3212,8 @@
         </p:nvSpPr>
         <p:spPr bwMode="auto">
           <a:xfrm flipH="0" flipV="0">
-            <a:off x="1180169" y="-500465"/>
-            <a:ext cx="914400" cy="365795"/>
+            <a:off x="1180168" y="-500464"/>
+            <a:ext cx="914436" cy="365795"/>
           </a:xfrm>
           <a:prstGeom prst="rect">
             <a:avLst/>
@@ -3232,8 +3240,8 @@
         </p:nvSpPr>
         <p:spPr bwMode="auto">
           <a:xfrm flipH="0" flipV="0">
-            <a:off x="1073780" y="858861"/>
-            <a:ext cx="10246514" cy="389739"/>
+            <a:off x="1053639" y="858861"/>
+            <a:ext cx="10246514" cy="640923"/>
           </a:xfrm>
           <a:prstGeom prst="rect">
             <a:avLst/>
@@ -3245,14 +3253,547 @@
             <a:noAutofit/>
           </a:bodyPr>
           <a:p>
-            <a:pPr>
-              <a:defRPr/>
-            </a:pPr>
-            <a:r>
-              <a:rPr lang="es-CO"/>
+            <a:pPr algn="ctr">
+              <a:defRPr/>
+            </a:pPr>
+            <a:r>
+              <a:rPr lang="es-CO" sz="3200"/>
               <a:t>Comandos mas utilizados en GIT</a:t>
             </a:r>
-            <a:endParaRPr lang="es-CO"/>
+            <a:endParaRPr sz="3200"/>
+          </a:p>
+        </p:txBody>
+      </p:sp>
+      <p:sp>
+        <p:nvSpPr>
+          <p:cNvPr id="6" name="" hidden="0"/>
+          <p:cNvSpPr/>
+          <p:nvPr isPhoto="0" userDrawn="0"/>
+        </p:nvSpPr>
+        <p:spPr bwMode="auto">
+          <a:xfrm flipH="0" flipV="0">
+            <a:off x="1053639" y="1671287"/>
+            <a:ext cx="10374477" cy="4236755"/>
+          </a:xfrm>
+          <a:prstGeom prst="rect">
+            <a:avLst/>
+          </a:prstGeom>
+          <a:noFill/>
+        </p:spPr>
+        <p:txBody>
+          <a:bodyPr vertOverflow="overflow" horzOverflow="clip" vert="horz" wrap="square" lIns="91440" tIns="45720" rIns="91440" bIns="45720" numCol="1" spcCol="0" rtlCol="0" fromWordArt="0" anchor="t" anchorCtr="0" forceAA="0" upright="0" compatLnSpc="0">
+            <a:spAutoFit/>
+          </a:bodyPr>
+          <a:p>
+            <a:pPr marL="0" indent="0">
+              <a:defRPr/>
+            </a:pPr>
+            <a:r>
+              <a:rPr lang="es-CO" sz="1600"/>
+              <a:t>INICIO</a:t>
+            </a:r>
+            <a:endParaRPr sz="1600"/>
+          </a:p>
+          <a:p>
+            <a:pPr marL="0" indent="0">
+              <a:defRPr/>
+            </a:pPr>
+            <a:r>
+              <a:rPr lang="es-CO" sz="1600"/>
+              <a:t>configurar email</a:t>
+            </a:r>
+            <a:endParaRPr sz="1600"/>
+          </a:p>
+          <a:p>
+            <a:pPr marL="0" indent="0">
+              <a:defRPr/>
+            </a:pPr>
+            <a:r>
+              <a:rPr lang="es-CO" sz="1600"/>
+              <a:t>git config --global user.email “&lt;email&gt;”</a:t>
+            </a:r>
+            <a:endParaRPr sz="1600"/>
+          </a:p>
+          <a:p>
+            <a:pPr marL="0" indent="0">
+              <a:defRPr/>
+            </a:pPr>
+            <a:r>
+              <a:rPr lang="es-CO" sz="1600" b="0" i="0" u="none" strike="noStrike" cap="none" spc="0">
+                <a:solidFill>
+                  <a:schemeClr val="tx1"/>
+                </a:solidFill>
+                <a:latin typeface="+mn-lt"/>
+                <a:ea typeface="+mn-ea"/>
+                <a:cs typeface="+mn-cs"/>
+              </a:rPr>
+              <a:t>configurar nombre de usuario de la computadora</a:t>
+            </a:r>
+            <a:endParaRPr sz="1600"/>
+          </a:p>
+          <a:p>
+            <a:pPr marL="0" indent="0">
+              <a:defRPr/>
+            </a:pPr>
+            <a:r>
+              <a:rPr lang="es-CO" sz="1600"/>
+              <a:t>git config --global user.name “&lt;nombre del usuario&gt;”</a:t>
+            </a:r>
+            <a:endParaRPr sz="1600"/>
+          </a:p>
+          <a:p>
+            <a:pPr marL="0" indent="0">
+              <a:defRPr/>
+            </a:pPr>
+            <a:r>
+              <a:rPr lang="es-CO" sz="1600"/>
+              <a:t>configurar colores de git </a:t>
+            </a:r>
+            <a:endParaRPr sz="1600"/>
+          </a:p>
+          <a:p>
+            <a:pPr marL="0" indent="0">
+              <a:defRPr/>
+            </a:pPr>
+            <a:r>
+              <a:rPr lang="es-CO" sz="1600"/>
+              <a:t>git config --global color.ui true</a:t>
+            </a:r>
+            <a:endParaRPr sz="1600"/>
+          </a:p>
+          <a:p>
+            <a:pPr marL="0" indent="0">
+              <a:defRPr/>
+            </a:pPr>
+            <a:endParaRPr sz="1600"/>
+          </a:p>
+          <a:p>
+            <a:pPr marL="0" indent="0">
+              <a:defRPr/>
+            </a:pPr>
+            <a:r>
+              <a:rPr lang="es-CO" sz="1600"/>
+              <a:t>WORKING DIRECTORY</a:t>
+            </a:r>
+            <a:endParaRPr sz="1600"/>
+          </a:p>
+          <a:p>
+            <a:pPr marL="0" indent="0">
+              <a:defRPr/>
+            </a:pPr>
+            <a:r>
+              <a:rPr lang="es-CO" sz="1600"/>
+              <a:t>inicializar un repositorio para trabajar con git</a:t>
+            </a:r>
+            <a:endParaRPr sz="1600"/>
+          </a:p>
+          <a:p>
+            <a:pPr marL="0" indent="0">
+              <a:defRPr/>
+            </a:pPr>
+            <a:r>
+              <a:rPr lang="es-CO" sz="1600"/>
+              <a:t>git init</a:t>
+            </a:r>
+            <a:endParaRPr sz="1600"/>
+          </a:p>
+          <a:p>
+            <a:pPr marL="0" indent="0">
+              <a:defRPr/>
+            </a:pPr>
+            <a:r>
+              <a:rPr lang="es-CO" sz="1600"/>
+              <a:t>git init &lt;a&gt;</a:t>
+            </a:r>
+            <a:endParaRPr sz="1600"/>
+          </a:p>
+          <a:p>
+            <a:pPr>
+              <a:defRPr/>
+            </a:pPr>
+            <a:r>
+              <a:rPr lang="es-CO" sz="1600"/>
+              <a:t>a: nombre de la carpeta donde del proyecto que quiero crear e inicializar</a:t>
+            </a:r>
+            <a:endParaRPr sz="1600"/>
+          </a:p>
+          <a:p>
+            <a:pPr>
+              <a:defRPr/>
+            </a:pPr>
+            <a:r>
+              <a:rPr lang="es-CO" sz="1600" b="0" i="0" u="none" strike="noStrike" cap="none" spc="0">
+                <a:solidFill>
+                  <a:schemeClr val="tx1"/>
+                </a:solidFill>
+                <a:latin typeface="+mn-lt"/>
+                <a:ea typeface="+mn-ea"/>
+                <a:cs typeface="+mn-cs"/>
+              </a:rPr>
+              <a:t>Para ver el estado del repositorio</a:t>
+            </a:r>
+            <a:endParaRPr sz="1600"/>
+          </a:p>
+          <a:p>
+            <a:pPr>
+              <a:defRPr/>
+            </a:pPr>
+            <a:r>
+              <a:rPr lang="es-CO" sz="1600"/>
+              <a:t>git status</a:t>
+            </a:r>
+            <a:endParaRPr sz="1600"/>
+          </a:p>
+          <a:p>
+            <a:pPr>
+              <a:defRPr/>
+            </a:pPr>
+            <a:r>
+              <a:rPr lang="es-CO" sz="1600" b="0" i="0" u="none" strike="noStrike" cap="none" spc="0">
+                <a:solidFill>
+                  <a:schemeClr val="tx1"/>
+                </a:solidFill>
+                <a:latin typeface="+mn-lt"/>
+                <a:ea typeface="+mn-ea"/>
+                <a:cs typeface="+mn-cs"/>
+              </a:rPr>
+              <a:t>git add &lt;a&gt;</a:t>
+            </a:r>
+            <a:endParaRPr sz="1600"/>
+          </a:p>
+          <a:p>
+            <a:pPr>
+              <a:defRPr/>
+            </a:pPr>
+            <a:r>
+              <a:rPr lang="es-CO" sz="1600" b="0" i="0" u="none" strike="noStrike" cap="none" spc="0">
+                <a:solidFill>
+                  <a:schemeClr val="tx1"/>
+                </a:solidFill>
+                <a:latin typeface="+mn-lt"/>
+                <a:ea typeface="+mn-ea"/>
+                <a:cs typeface="+mn-cs"/>
+              </a:rPr>
+              <a:t>a: nombre del archivo a pasar al stage</a:t>
+            </a:r>
+            <a:endParaRPr sz="1600" b="0" i="0" u="none" strike="noStrike" cap="none" spc="0">
+              <a:solidFill>
+                <a:schemeClr val="tx1"/>
+              </a:solidFill>
+              <a:latin typeface="+mn-lt"/>
+              <a:ea typeface="+mn-ea"/>
+              <a:cs typeface="+mn-cs"/>
+            </a:endParaRPr>
+          </a:p>
+        </p:txBody>
+      </p:sp>
+    </p:spTree>
+  </p:cSld>
+  <p:clrMapOvr>
+    <a:masterClrMapping/>
+  </p:clrMapOvr>
+  <mc:AlternateContent xmlns:mc="http://schemas.openxmlformats.org/markup-compatibility/2006">
+    <mc:Choice xmlns:p14="http://schemas.microsoft.com/office/powerpoint/2010/main" Requires="p14">
+      <p:transition p14:dur="2000" advClick="1"/>
+    </mc:Choice>
+    <mc:Fallback>
+      <p:transition advClick="1"/>
+    </mc:Fallback>
+  </mc:AlternateContent>
+</p:sld>
+</file>
+
+<file path=ppt/slides/slide2.xml><?xml version="1.0" encoding="utf-8"?>
+<p:sld xmlns:a="http://schemas.openxmlformats.org/drawingml/2006/main" xmlns:r="http://schemas.openxmlformats.org/officeDocument/2006/relationships" xmlns:p="http://schemas.openxmlformats.org/presentationml/2006/main" xmlns:m="http://schemas.openxmlformats.org/officeDocument/2006/math" xmlns:w="http://schemas.openxmlformats.org/wordprocessingml/2006/main" showMasterPhAnim="0" show="1">
+  <p:cSld name="">
+    <p:bg>
+      <p:bgPr shadeToTitle="0">
+        <a:solidFill>
+          <a:schemeClr val="accent1"/>
+        </a:solidFill>
+      </p:bgPr>
+    </p:bg>
+    <p:spTree>
+      <p:nvGrpSpPr>
+        <p:cNvPr id="1" name="" hidden="0"/>
+        <p:cNvGrpSpPr/>
+        <p:nvPr isPhoto="0" userDrawn="0"/>
+      </p:nvGrpSpPr>
+      <p:grpSpPr bwMode="auto">
+        <a:xfrm>
+          <a:off x="0" y="0"/>
+          <a:ext cx="0" cy="0"/>
+          <a:chOff x="0" y="0"/>
+          <a:chExt cx="0" cy="0"/>
+        </a:xfrm>
+      </p:grpSpPr>
+      <p:sp>
+        <p:nvSpPr>
+          <p:cNvPr id="4" name="" hidden="0"/>
+          <p:cNvSpPr/>
+          <p:nvPr isPhoto="0" userDrawn="0"/>
+        </p:nvSpPr>
+        <p:spPr bwMode="auto">
+          <a:xfrm flipH="0" flipV="0">
+            <a:off x="829521" y="700367"/>
+            <a:ext cx="10548076" cy="5463667"/>
+          </a:xfrm>
+          <a:prstGeom prst="rect">
+            <a:avLst/>
+          </a:prstGeom>
+          <a:noFill/>
+        </p:spPr>
+        <p:txBody>
+          <a:bodyPr vertOverflow="overflow" horzOverflow="clip" vert="horz" wrap="square" lIns="91440" tIns="45720" rIns="91440" bIns="45720" numCol="1" spcCol="0" rtlCol="0" fromWordArt="0" anchor="t" anchorCtr="0" forceAA="0" upright="0" compatLnSpc="0">
+            <a:noAutofit/>
+          </a:bodyPr>
+          <a:p>
+            <a:pPr>
+              <a:defRPr/>
+            </a:pPr>
+            <a:r>
+              <a:rPr lang="es-CO" sz="1600" b="0" i="0" u="none" strike="noStrike" cap="none" spc="0">
+                <a:solidFill>
+                  <a:schemeClr val="tx1"/>
+                </a:solidFill>
+                <a:latin typeface="+mn-lt"/>
+                <a:ea typeface="+mn-ea"/>
+                <a:cs typeface="+mn-cs"/>
+              </a:rPr>
+              <a:t>git add ./git add -A : guarda todos los archivos que esten listos para pasar al stage</a:t>
+            </a:r>
+            <a:endParaRPr sz="1600"/>
+          </a:p>
+          <a:p>
+            <a:pPr>
+              <a:defRPr/>
+            </a:pPr>
+            <a:r>
+              <a:rPr lang="es-CO" sz="1600" b="0" i="0" u="none" strike="noStrike" cap="none" spc="0">
+                <a:solidFill>
+                  <a:schemeClr val="tx1"/>
+                </a:solidFill>
+                <a:latin typeface="+mn-lt"/>
+                <a:ea typeface="+mn-ea"/>
+                <a:cs typeface="+mn-cs"/>
+              </a:rPr>
+              <a:t>git add -n &lt;a&gt;</a:t>
+            </a:r>
+            <a:endParaRPr sz="1600"/>
+          </a:p>
+          <a:p>
+            <a:pPr>
+              <a:defRPr/>
+            </a:pPr>
+            <a:r>
+              <a:rPr lang="es-CO" sz="1600" b="0" i="0" u="none" strike="noStrike" cap="none" spc="0">
+                <a:solidFill>
+                  <a:schemeClr val="tx1"/>
+                </a:solidFill>
+                <a:latin typeface="+mn-lt"/>
+                <a:ea typeface="+mn-ea"/>
+                <a:cs typeface="+mn-cs"/>
+              </a:rPr>
+              <a:t>a: mirar si el aechivo existe</a:t>
+            </a:r>
+            <a:endParaRPr sz="1600" b="0" i="0" u="none" strike="noStrike" cap="none" spc="0">
+              <a:solidFill>
+                <a:schemeClr val="tx1"/>
+              </a:solidFill>
+              <a:latin typeface="+mn-lt"/>
+              <a:ea typeface="+mn-lt"/>
+              <a:cs typeface="+mn-lt"/>
+            </a:endParaRPr>
+          </a:p>
+          <a:p>
+            <a:pPr>
+              <a:defRPr/>
+            </a:pPr>
+            <a:endParaRPr sz="1600" b="0" i="0" u="none" strike="noStrike" cap="none" spc="0">
+              <a:solidFill>
+                <a:schemeClr val="tx1"/>
+              </a:solidFill>
+              <a:latin typeface="+mn-lt"/>
+              <a:ea typeface="+mn-ea"/>
+              <a:cs typeface="+mn-cs"/>
+            </a:endParaRPr>
+          </a:p>
+          <a:p>
+            <a:pPr>
+              <a:defRPr/>
+            </a:pPr>
+            <a:r>
+              <a:rPr lang="es-CO" sz="1600" b="0" i="0" u="none" strike="noStrike" cap="none" spc="0">
+                <a:solidFill>
+                  <a:schemeClr val="tx1"/>
+                </a:solidFill>
+                <a:latin typeface="+mn-lt"/>
+                <a:ea typeface="+mn-ea"/>
+                <a:cs typeface="+mn-cs"/>
+              </a:rPr>
+              <a:t>STAGE</a:t>
+            </a:r>
+            <a:endParaRPr sz="1600"/>
+          </a:p>
+          <a:p>
+            <a:pPr>
+              <a:defRPr/>
+            </a:pPr>
+            <a:r>
+              <a:rPr lang="es-CO" sz="1600" b="0" i="0" u="none" strike="noStrike" cap="none" spc="0">
+                <a:solidFill>
+                  <a:schemeClr val="tx1"/>
+                </a:solidFill>
+                <a:latin typeface="+mn-lt"/>
+                <a:ea typeface="+mn-ea"/>
+                <a:cs typeface="+mn-cs"/>
+              </a:rPr>
+              <a:t>git rm --cached &lt;a&gt;</a:t>
+            </a:r>
+            <a:endParaRPr sz="1600"/>
+          </a:p>
+          <a:p>
+            <a:pPr>
+              <a:defRPr/>
+            </a:pPr>
+            <a:r>
+              <a:rPr lang="es-CO" sz="1600" b="0" i="0" u="none" strike="noStrike" cap="none" spc="0">
+                <a:solidFill>
+                  <a:schemeClr val="tx1"/>
+                </a:solidFill>
+                <a:latin typeface="+mn-lt"/>
+                <a:ea typeface="+mn-ea"/>
+                <a:cs typeface="+mn-cs"/>
+              </a:rPr>
+              <a:t>a: nombre del archivo que quiero borrar del stage</a:t>
+            </a:r>
+            <a:endParaRPr sz="1600"/>
+          </a:p>
+          <a:p>
+            <a:pPr>
+              <a:defRPr/>
+            </a:pPr>
+            <a:r>
+              <a:rPr lang="es-CO" sz="1600" b="0" i="0" u="none" strike="noStrike" cap="none" spc="0">
+                <a:solidFill>
+                  <a:schemeClr val="tx1"/>
+                </a:solidFill>
+                <a:latin typeface="+mn-lt"/>
+                <a:ea typeface="+mn-ea"/>
+                <a:cs typeface="+mn-cs"/>
+              </a:rPr>
+              <a:t>git rm -f &lt;a&gt;</a:t>
+            </a:r>
+            <a:endParaRPr sz="1600"/>
+          </a:p>
+          <a:p>
+            <a:pPr>
+              <a:defRPr/>
+            </a:pPr>
+            <a:r>
+              <a:rPr lang="es-CO" sz="1600" b="0" i="0" u="none" strike="noStrike" cap="none" spc="0">
+                <a:solidFill>
+                  <a:schemeClr val="tx1"/>
+                </a:solidFill>
+                <a:latin typeface="+mn-lt"/>
+                <a:ea typeface="+mn-ea"/>
+                <a:cs typeface="+mn-cs"/>
+              </a:rPr>
+              <a:t>a: nombre del archivo que quiero borrar definitivamente</a:t>
+            </a:r>
+            <a:endParaRPr lang="es-CO" sz="1600" b="0" i="0" u="none" strike="noStrike" cap="none" spc="0">
+              <a:solidFill>
+                <a:schemeClr val="tx1"/>
+              </a:solidFill>
+              <a:latin typeface="+mn-lt"/>
+              <a:ea typeface="+mn-ea"/>
+              <a:cs typeface="+mn-cs"/>
+            </a:endParaRPr>
+          </a:p>
+          <a:p>
+            <a:pPr>
+              <a:defRPr/>
+            </a:pPr>
+            <a:r>
+              <a:rPr lang="es-CO" sz="1600" b="0" i="0" u="none" strike="noStrike" cap="none" spc="0">
+                <a:solidFill>
+                  <a:schemeClr val="tx1"/>
+                </a:solidFill>
+                <a:latin typeface="+mn-lt"/>
+                <a:ea typeface="+mn-ea"/>
+                <a:cs typeface="+mn-cs"/>
+              </a:rPr>
+              <a:t>pasar del stage al repositorio local</a:t>
+            </a:r>
+            <a:endParaRPr lang="es-CO" sz="1600" b="0" i="0" u="none" strike="noStrike" cap="none" spc="0">
+              <a:solidFill>
+                <a:schemeClr val="tx1"/>
+              </a:solidFill>
+              <a:latin typeface="Arial"/>
+              <a:ea typeface="Arial"/>
+              <a:cs typeface="Arial"/>
+            </a:endParaRPr>
+          </a:p>
+          <a:p>
+            <a:pPr>
+              <a:defRPr/>
+            </a:pPr>
+            <a:r>
+              <a:rPr lang="es-CO" sz="1600" b="0" i="0" u="none" strike="noStrike" cap="none" spc="0">
+                <a:solidFill>
+                  <a:schemeClr val="tx1"/>
+                </a:solidFill>
+                <a:latin typeface="+mn-lt"/>
+                <a:ea typeface="+mn-ea"/>
+                <a:cs typeface="+mn-cs"/>
+              </a:rPr>
+              <a:t>git commit -m "&lt;mensaje del commit&gt;"</a:t>
+            </a:r>
+            <a:endParaRPr lang="es-CO" sz="1600"/>
+          </a:p>
+          <a:p>
+            <a:pPr>
+              <a:defRPr/>
+            </a:pPr>
+            <a:endParaRPr sz="1600" b="0" i="0" u="none" strike="noStrike" cap="none" spc="0">
+              <a:solidFill>
+                <a:schemeClr val="tx1"/>
+              </a:solidFill>
+              <a:latin typeface="+mn-lt"/>
+              <a:ea typeface="+mn-ea"/>
+              <a:cs typeface="+mn-cs"/>
+            </a:endParaRPr>
+          </a:p>
+          <a:p>
+            <a:pPr>
+              <a:defRPr/>
+            </a:pPr>
+            <a:endParaRPr lang="en-US" sz="1800" b="0" i="0" u="none" strike="noStrike" cap="none" spc="0">
+              <a:solidFill>
+                <a:schemeClr val="tx1"/>
+              </a:solidFill>
+              <a:latin typeface="+mn-lt"/>
+              <a:ea typeface="+mn-ea"/>
+              <a:cs typeface="+mn-cs"/>
+            </a:endParaRPr>
+          </a:p>
+          <a:p>
+            <a:pPr>
+              <a:defRPr/>
+            </a:pPr>
+            <a:endParaRPr sz="1800"/>
+          </a:p>
+          <a:p>
+            <a:pPr>
+              <a:defRPr/>
+            </a:pPr>
+            <a:endParaRPr lang="en-US" sz="1800"/>
+          </a:p>
+          <a:p>
+            <a:pPr>
+              <a:defRPr/>
+            </a:pPr>
+            <a:endParaRPr lang="en-US" sz="1800"/>
           </a:p>
         </p:txBody>
       </p:sp>
@@ -3273,7 +3814,7 @@
 </file>
 
 <file path=ppt/theme/theme1.xml><?xml version="1.0" encoding="utf-8"?>
-<a:theme xmlns:a="http://schemas.openxmlformats.org/drawingml/2006/main" xmlns:r="http://schemas.openxmlformats.org/officeDocument/2006/relationships" xmlns:p="http://schemas.openxmlformats.org/presentationml/2006/main" name="Office Theme">
+<a:theme xmlns:a="http://schemas.openxmlformats.org/drawingml/2006/main" xmlns:r="http://schemas.openxmlformats.org/officeDocument/2006/relationships" xmlns:p="http://schemas.openxmlformats.org/presentationml/2006/main" name="Blank">
   <a:themeElements>
     <a:clrScheme name="Office Theme">
       <a:dk1>
@@ -3313,7 +3854,7 @@
         <a:srgbClr val="954F72"/>
       </a:folHlink>
     </a:clrScheme>
-    <a:fontScheme name="Office Theme">
+    <a:fontScheme name="">
       <a:majorFont>
         <a:latin typeface="Arial"/>
         <a:ea typeface="Arial"/>
@@ -3389,21 +3930,21 @@
             <a:schemeClr val="phClr"/>
           </a:solidFill>
           <a:prstDash val="solid"/>
-          <a:miter lim="800000"/>
+          <a:miter/>
         </a:ln>
         <a:ln w="12700" cap="flat" cmpd="sng" algn="ctr">
           <a:solidFill>
             <a:schemeClr val="phClr"/>
           </a:solidFill>
           <a:prstDash val="solid"/>
-          <a:miter lim="800000"/>
+          <a:miter/>
         </a:ln>
         <a:ln w="19050" cap="flat" cmpd="sng" algn="ctr">
           <a:solidFill>
             <a:schemeClr val="phClr"/>
           </a:solidFill>
           <a:prstDash val="solid"/>
-          <a:miter lim="800000"/>
+          <a:miter/>
         </a:ln>
       </a:lnStyleLst>
       <a:effectStyleLst>

</xml_diff>

<commit_message>
Edicion de comandos hasta los TAGS
</commit_message>
<xml_diff>
--- a/presentasionComandos.pptx
+++ b/presentasionComandos.pptx
@@ -7,6 +7,7 @@
   <p:sldIdLst>
     <p:sldId id="256" r:id="rId3"/>
     <p:sldId id="257" r:id="rId4"/>
+    <p:sldId id="258" r:id="rId5"/>
   </p:sldIdLst>
   <p:sldSz cx="12192000" cy="6858000"/>
   <p:notesSz cx="6858000" cy="12192000"/>
@@ -3749,6 +3750,296 @@
               </a:rPr>
               <a:t>git commit -m "&lt;mensaje del commit&gt;"</a:t>
             </a:r>
+            <a:endParaRPr lang="es-CO" sz="1600" b="0" i="0" u="none" strike="noStrike" cap="none" spc="0">
+              <a:solidFill>
+                <a:schemeClr val="tx1"/>
+              </a:solidFill>
+              <a:latin typeface="+mn-lt"/>
+              <a:ea typeface="+mn-ea"/>
+              <a:cs typeface="+mn-cs"/>
+            </a:endParaRPr>
+          </a:p>
+          <a:p>
+            <a:pPr>
+              <a:defRPr/>
+            </a:pPr>
+            <a:r>
+              <a:rPr lang="es-CO" sz="1600" b="0" i="0" u="none" strike="noStrike" cap="none" spc="0">
+                <a:solidFill>
+                  <a:schemeClr val="tx1"/>
+                </a:solidFill>
+                <a:latin typeface="+mn-lt"/>
+                <a:ea typeface="+mn-ea"/>
+                <a:cs typeface="+mn-cs"/>
+              </a:rPr>
+              <a:t>corregir el commit anterior</a:t>
+            </a:r>
+            <a:endParaRPr lang="es-CO" sz="1600" b="0" i="0" u="none" strike="noStrike" cap="none" spc="0">
+              <a:solidFill>
+                <a:schemeClr val="tx1"/>
+              </a:solidFill>
+              <a:latin typeface="Arial"/>
+              <a:ea typeface="Arial"/>
+              <a:cs typeface="Arial"/>
+            </a:endParaRPr>
+          </a:p>
+          <a:p>
+            <a:pPr>
+              <a:defRPr/>
+            </a:pPr>
+            <a:r>
+              <a:rPr lang="es-CO" sz="1600" b="0" i="0" u="none" strike="noStrike" cap="none" spc="0">
+                <a:solidFill>
+                  <a:schemeClr val="tx1"/>
+                </a:solidFill>
+                <a:latin typeface="+mn-lt"/>
+                <a:ea typeface="+mn-ea"/>
+                <a:cs typeface="+mn-cs"/>
+              </a:rPr>
+              <a:t>git commit --amend</a:t>
+            </a:r>
+            <a:endParaRPr lang="es-CO" sz="1600" b="0" i="0" u="none" strike="noStrike" cap="none" spc="0">
+              <a:solidFill>
+                <a:schemeClr val="tx1"/>
+              </a:solidFill>
+              <a:latin typeface="+mn-lt"/>
+              <a:ea typeface="+mn-ea"/>
+              <a:cs typeface="+mn-cs"/>
+            </a:endParaRPr>
+          </a:p>
+          <a:p>
+            <a:pPr>
+              <a:defRPr/>
+            </a:pPr>
+            <a:r>
+              <a:rPr lang="es-CO" sz="1600" b="0" i="0" u="none" strike="noStrike" cap="none" spc="0">
+                <a:solidFill>
+                  <a:schemeClr val="tx1"/>
+                </a:solidFill>
+                <a:latin typeface="+mn-lt"/>
+                <a:ea typeface="+mn-ea"/>
+                <a:cs typeface="+mn-cs"/>
+              </a:rPr>
+              <a:t>git commit --amend -m "&lt;nuevo mensaje&gt;"</a:t>
+            </a:r>
+            <a:endParaRPr lang="es-CO" sz="1600" b="0" i="0" u="none" strike="noStrike" cap="none" spc="0">
+              <a:solidFill>
+                <a:schemeClr val="tx1"/>
+              </a:solidFill>
+              <a:latin typeface="+mn-lt"/>
+              <a:ea typeface="+mn-ea"/>
+              <a:cs typeface="+mn-cs"/>
+            </a:endParaRPr>
+          </a:p>
+          <a:p>
+            <a:pPr>
+              <a:defRPr/>
+            </a:pPr>
+            <a:r>
+              <a:rPr lang="es-CO" sz="1600" b="0" i="0" u="none" strike="noStrike" cap="none" spc="0">
+                <a:solidFill>
+                  <a:schemeClr val="tx1"/>
+                </a:solidFill>
+                <a:latin typeface="+mn-lt"/>
+                <a:ea typeface="+mn-ea"/>
+                <a:cs typeface="+mn-cs"/>
+              </a:rPr>
+              <a:t>ver la linea de commits</a:t>
+            </a:r>
+            <a:endParaRPr lang="es-CO" sz="1600" b="0" i="0" u="none" strike="noStrike" cap="none" spc="0">
+              <a:solidFill>
+                <a:schemeClr val="tx1"/>
+              </a:solidFill>
+              <a:latin typeface="+mn-lt"/>
+              <a:ea typeface="+mn-ea"/>
+              <a:cs typeface="+mn-cs"/>
+            </a:endParaRPr>
+          </a:p>
+          <a:p>
+            <a:pPr>
+              <a:defRPr/>
+            </a:pPr>
+            <a:r>
+              <a:rPr lang="es-CO" sz="1600" b="0" i="0" u="none" strike="noStrike" cap="none" spc="0">
+                <a:solidFill>
+                  <a:schemeClr val="tx1"/>
+                </a:solidFill>
+                <a:latin typeface="+mn-lt"/>
+                <a:ea typeface="+mn-ea"/>
+                <a:cs typeface="+mn-cs"/>
+              </a:rPr>
+              <a:t>git log</a:t>
+            </a:r>
+            <a:endParaRPr lang="es-CO" sz="1600" b="0" i="0" u="none" strike="noStrike" cap="none" spc="0">
+              <a:solidFill>
+                <a:schemeClr val="tx1"/>
+              </a:solidFill>
+              <a:latin typeface="+mn-lt"/>
+              <a:ea typeface="+mn-ea"/>
+              <a:cs typeface="+mn-cs"/>
+            </a:endParaRPr>
+          </a:p>
+          <a:p>
+            <a:pPr>
+              <a:defRPr/>
+            </a:pPr>
+            <a:r>
+              <a:rPr lang="es-CO" sz="1600" b="0" i="0" u="none" strike="noStrike" cap="none" spc="0">
+                <a:solidFill>
+                  <a:schemeClr val="tx1"/>
+                </a:solidFill>
+                <a:latin typeface="+mn-lt"/>
+                <a:ea typeface="+mn-ea"/>
+                <a:cs typeface="+mn-cs"/>
+              </a:rPr>
+              <a:t>ver la linea de commits resumidos</a:t>
+            </a:r>
+            <a:endParaRPr lang="es-CO" sz="1600" b="0" i="0" u="none" strike="noStrike" cap="none" spc="0">
+              <a:solidFill>
+                <a:schemeClr val="tx1"/>
+              </a:solidFill>
+              <a:latin typeface="Arial"/>
+              <a:ea typeface="Arial"/>
+              <a:cs typeface="Arial"/>
+            </a:endParaRPr>
+          </a:p>
+          <a:p>
+            <a:pPr>
+              <a:defRPr/>
+            </a:pPr>
+            <a:r>
+              <a:rPr lang="es-CO" sz="1600" b="0" i="0" u="none" strike="noStrike" cap="none" spc="0">
+                <a:solidFill>
+                  <a:schemeClr val="tx1"/>
+                </a:solidFill>
+                <a:latin typeface="+mn-lt"/>
+                <a:ea typeface="+mn-ea"/>
+                <a:cs typeface="+mn-cs"/>
+              </a:rPr>
+              <a:t>git log --oneline </a:t>
+            </a:r>
+            <a:endParaRPr lang="es-CO" sz="1600" b="0" i="0" u="none" strike="noStrike" cap="none" spc="0">
+              <a:solidFill>
+                <a:schemeClr val="tx1"/>
+              </a:solidFill>
+              <a:latin typeface="+mn-lt"/>
+              <a:ea typeface="+mn-ea"/>
+              <a:cs typeface="+mn-cs"/>
+            </a:endParaRPr>
+          </a:p>
+          <a:p>
+            <a:pPr>
+              <a:defRPr/>
+            </a:pPr>
+            <a:r>
+              <a:rPr lang="es-CO" sz="1600" b="0" i="0" u="none" strike="noStrike" cap="none" spc="0">
+                <a:solidFill>
+                  <a:schemeClr val="tx1"/>
+                </a:solidFill>
+                <a:latin typeface="+mn-lt"/>
+                <a:ea typeface="+mn-ea"/>
+                <a:cs typeface="+mn-cs"/>
+              </a:rPr>
+              <a:t>ver el grafico de la linea de los commits</a:t>
+            </a:r>
+            <a:endParaRPr lang="es-CO" sz="1600" b="0" i="0" u="none" strike="noStrike" cap="none" spc="0">
+              <a:solidFill>
+                <a:schemeClr val="tx1"/>
+              </a:solidFill>
+              <a:latin typeface="Arial"/>
+              <a:ea typeface="Arial"/>
+              <a:cs typeface="Arial"/>
+            </a:endParaRPr>
+          </a:p>
+          <a:p>
+            <a:pPr>
+              <a:defRPr/>
+            </a:pPr>
+            <a:r>
+              <a:rPr lang="es-CO" sz="1600" b="0" i="0" u="none" strike="noStrike" cap="none" spc="0">
+                <a:solidFill>
+                  <a:schemeClr val="tx1"/>
+                </a:solidFill>
+                <a:latin typeface="+mn-lt"/>
+                <a:ea typeface="+mn-ea"/>
+                <a:cs typeface="+mn-cs"/>
+              </a:rPr>
+              <a:t>git log --oneline --graph</a:t>
+            </a:r>
+            <a:endParaRPr lang="es-CO" sz="1600" b="0" i="0" u="none" strike="noStrike" cap="none" spc="0">
+              <a:solidFill>
+                <a:schemeClr val="tx1"/>
+              </a:solidFill>
+              <a:latin typeface="+mn-lt"/>
+              <a:ea typeface="+mn-ea"/>
+              <a:cs typeface="+mn-cs"/>
+            </a:endParaRPr>
+          </a:p>
+          <a:p>
+            <a:pPr>
+              <a:defRPr/>
+            </a:pPr>
+            <a:r>
+              <a:rPr lang="es-CO" sz="1600" b="0" i="0" u="none" strike="noStrike" cap="none" spc="0">
+                <a:solidFill>
+                  <a:schemeClr val="tx1"/>
+                </a:solidFill>
+                <a:latin typeface="+mn-lt"/>
+                <a:ea typeface="+mn-ea"/>
+                <a:cs typeface="+mn-cs"/>
+              </a:rPr>
+              <a:t>ver un numero determinado de comits</a:t>
+            </a:r>
+            <a:endParaRPr lang="es-CO" sz="1600" b="0" i="0" u="none" strike="noStrike" cap="none" spc="0">
+              <a:solidFill>
+                <a:schemeClr val="tx1"/>
+              </a:solidFill>
+              <a:latin typeface="Arial"/>
+              <a:ea typeface="Arial"/>
+              <a:cs typeface="Arial"/>
+            </a:endParaRPr>
+          </a:p>
+          <a:p>
+            <a:pPr>
+              <a:defRPr/>
+            </a:pPr>
+            <a:r>
+              <a:rPr lang="es-CO" sz="1600" b="0" i="0" u="none" strike="noStrike" cap="none" spc="0">
+                <a:solidFill>
+                  <a:schemeClr val="tx1"/>
+                </a:solidFill>
+                <a:latin typeface="+mn-lt"/>
+                <a:ea typeface="+mn-ea"/>
+                <a:cs typeface="+mn-cs"/>
+              </a:rPr>
+              <a:t>git log -&lt;2&gt;</a:t>
+            </a:r>
+            <a:endParaRPr lang="es-CO" sz="1600" b="0" i="0" u="none" strike="noStrike" cap="none" spc="0">
+              <a:solidFill>
+                <a:schemeClr val="tx1"/>
+              </a:solidFill>
+              <a:latin typeface="Arial"/>
+              <a:ea typeface="Arial"/>
+              <a:cs typeface="Arial"/>
+            </a:endParaRPr>
+          </a:p>
+          <a:p>
+            <a:pPr>
+              <a:defRPr/>
+            </a:pPr>
+            <a:endParaRPr lang="es-CO" sz="1600" b="0" i="0" u="none" strike="noStrike" cap="none" spc="0">
+              <a:solidFill>
+                <a:schemeClr val="tx1"/>
+              </a:solidFill>
+              <a:latin typeface="Arial"/>
+              <a:ea typeface="Arial"/>
+              <a:cs typeface="Arial"/>
+            </a:endParaRPr>
+          </a:p>
+          <a:p>
+            <a:pPr>
+              <a:defRPr/>
+            </a:pPr>
             <a:endParaRPr lang="es-CO" sz="1600"/>
           </a:p>
           <a:p>
@@ -3794,6 +4085,471 @@
               <a:defRPr/>
             </a:pPr>
             <a:endParaRPr lang="en-US" sz="1800"/>
+          </a:p>
+        </p:txBody>
+      </p:sp>
+    </p:spTree>
+  </p:cSld>
+  <p:clrMapOvr>
+    <a:masterClrMapping/>
+  </p:clrMapOvr>
+  <mc:AlternateContent xmlns:mc="http://schemas.openxmlformats.org/markup-compatibility/2006">
+    <mc:Choice xmlns:p14="http://schemas.microsoft.com/office/powerpoint/2010/main" Requires="p14">
+      <p:transition p14:dur="2000" advClick="1"/>
+    </mc:Choice>
+    <mc:Fallback>
+      <p:transition advClick="1"/>
+    </mc:Fallback>
+  </mc:AlternateContent>
+</p:sld>
+</file>
+
+<file path=ppt/slides/slide3.xml><?xml version="1.0" encoding="utf-8"?>
+<p:sld xmlns:a="http://schemas.openxmlformats.org/drawingml/2006/main" xmlns:r="http://schemas.openxmlformats.org/officeDocument/2006/relationships" xmlns:p="http://schemas.openxmlformats.org/presentationml/2006/main" xmlns:m="http://schemas.openxmlformats.org/officeDocument/2006/math" xmlns:w="http://schemas.openxmlformats.org/wordprocessingml/2006/main" showMasterPhAnim="0" show="1">
+  <p:cSld name="">
+    <p:bg>
+      <p:bgPr shadeToTitle="0">
+        <a:solidFill>
+          <a:schemeClr val="accent1"/>
+        </a:solidFill>
+      </p:bgPr>
+    </p:bg>
+    <p:spTree>
+      <p:nvGrpSpPr>
+        <p:cNvPr id="1" name="" hidden="0"/>
+        <p:cNvGrpSpPr/>
+        <p:nvPr isPhoto="0" userDrawn="0"/>
+      </p:nvGrpSpPr>
+      <p:grpSpPr bwMode="auto">
+        <a:xfrm>
+          <a:off x="0" y="0"/>
+          <a:ext cx="0" cy="0"/>
+          <a:chOff x="0" y="0"/>
+          <a:chExt cx="0" cy="0"/>
+        </a:xfrm>
+      </p:grpSpPr>
+      <p:sp>
+        <p:nvSpPr>
+          <p:cNvPr id="4" name="" hidden="0"/>
+          <p:cNvSpPr/>
+          <p:nvPr isPhoto="0" userDrawn="0"/>
+        </p:nvSpPr>
+        <p:spPr bwMode="auto">
+          <a:xfrm flipH="0" flipV="0">
+            <a:off x="829521" y="700367"/>
+            <a:ext cx="10548076" cy="5463667"/>
+          </a:xfrm>
+          <a:prstGeom prst="rect">
+            <a:avLst/>
+          </a:prstGeom>
+          <a:noFill/>
+        </p:spPr>
+        <p:txBody>
+          <a:bodyPr vertOverflow="overflow" horzOverflow="clip" vert="horz" wrap="square" lIns="91440" tIns="45720" rIns="91440" bIns="45720" numCol="1" spcCol="0" rtlCol="0" fromWordArt="0" anchor="t" anchorCtr="0" forceAA="0" upright="0" compatLnSpc="0">
+            <a:noAutofit/>
+          </a:bodyPr>
+          <a:p>
+            <a:pPr>
+              <a:defRPr/>
+            </a:pPr>
+            <a:r>
+              <a:rPr lang="es-CO" sz="1600" b="0" i="0" u="none" strike="noStrike" cap="none" spc="0">
+                <a:solidFill>
+                  <a:schemeClr val="tx1"/>
+                </a:solidFill>
+                <a:latin typeface="+mn-lt"/>
+                <a:ea typeface="+mn-ea"/>
+                <a:cs typeface="+mn-cs"/>
+              </a:rPr>
+              <a:t>TAGS ETIQUETAS </a:t>
+            </a:r>
+            <a:endParaRPr lang="es-CO" sz="1600" b="0" i="0" u="none" strike="noStrike" cap="none" spc="0">
+              <a:solidFill>
+                <a:schemeClr val="tx1"/>
+              </a:solidFill>
+              <a:latin typeface="+mn-lt"/>
+              <a:ea typeface="+mn-ea"/>
+              <a:cs typeface="+mn-cs"/>
+            </a:endParaRPr>
+          </a:p>
+          <a:p>
+            <a:pPr>
+              <a:defRPr/>
+            </a:pPr>
+            <a:r>
+              <a:rPr lang="es-CO" sz="1600" b="0" i="0" u="none" strike="noStrike" cap="none" spc="0">
+                <a:solidFill>
+                  <a:schemeClr val="tx1"/>
+                </a:solidFill>
+                <a:latin typeface="+mn-lt"/>
+                <a:ea typeface="+mn-ea"/>
+                <a:cs typeface="+mn-cs"/>
+              </a:rPr>
+              <a:t>ligeras</a:t>
+            </a:r>
+            <a:endParaRPr lang="es-CO" sz="1600" b="0" i="0" u="none" strike="noStrike" cap="none" spc="0">
+              <a:solidFill>
+                <a:schemeClr val="tx1"/>
+              </a:solidFill>
+              <a:latin typeface="Arial"/>
+              <a:ea typeface="Arial"/>
+              <a:cs typeface="Arial"/>
+            </a:endParaRPr>
+          </a:p>
+          <a:p>
+            <a:pPr>
+              <a:defRPr/>
+            </a:pPr>
+            <a:r>
+              <a:rPr lang="es-CO" sz="1600" b="0" i="0" u="none" strike="noStrike" cap="none" spc="0">
+                <a:solidFill>
+                  <a:schemeClr val="tx1"/>
+                </a:solidFill>
+                <a:latin typeface="+mn-lt"/>
+                <a:ea typeface="+mn-ea"/>
+                <a:cs typeface="+mn-cs"/>
+              </a:rPr>
+              <a:t>git tag &lt;a&gt;</a:t>
+            </a:r>
+            <a:endParaRPr lang="es-CO" sz="1600" b="0" i="0" u="none" strike="noStrike" cap="none" spc="0">
+              <a:solidFill>
+                <a:schemeClr val="tx1"/>
+              </a:solidFill>
+              <a:latin typeface="+mn-lt"/>
+              <a:ea typeface="+mn-ea"/>
+              <a:cs typeface="+mn-cs"/>
+            </a:endParaRPr>
+          </a:p>
+          <a:p>
+            <a:pPr>
+              <a:defRPr/>
+            </a:pPr>
+            <a:r>
+              <a:rPr lang="es-CO" sz="1600" b="0" i="0" u="none" strike="noStrike" cap="none" spc="0">
+                <a:solidFill>
+                  <a:schemeClr val="tx1"/>
+                </a:solidFill>
+                <a:latin typeface="+mn-lt"/>
+                <a:ea typeface="+mn-ea"/>
+                <a:cs typeface="+mn-cs"/>
+              </a:rPr>
+              <a:t>a: la version en numeros del proyecto</a:t>
+            </a:r>
+            <a:endParaRPr lang="es-CO" sz="1600" b="0" i="0" u="none" strike="noStrike" cap="none" spc="0">
+              <a:solidFill>
+                <a:schemeClr val="tx1"/>
+              </a:solidFill>
+              <a:latin typeface="Arial"/>
+              <a:ea typeface="Arial"/>
+              <a:cs typeface="Arial"/>
+            </a:endParaRPr>
+          </a:p>
+          <a:p>
+            <a:pPr>
+              <a:defRPr/>
+            </a:pPr>
+            <a:r>
+              <a:rPr lang="es-CO" sz="1600" b="0" i="0" u="none" strike="noStrike" cap="none" spc="0">
+                <a:solidFill>
+                  <a:schemeClr val="tx1"/>
+                </a:solidFill>
+                <a:latin typeface="+mn-lt"/>
+                <a:ea typeface="+mn-ea"/>
+                <a:cs typeface="+mn-cs"/>
+              </a:rPr>
+              <a:t>anotadas</a:t>
+            </a:r>
+            <a:endParaRPr lang="es-CO" sz="1600" b="0" i="0" u="none" strike="noStrike" cap="none" spc="0">
+              <a:solidFill>
+                <a:schemeClr val="tx1"/>
+              </a:solidFill>
+              <a:latin typeface="Arial"/>
+              <a:ea typeface="Arial"/>
+              <a:cs typeface="Arial"/>
+            </a:endParaRPr>
+          </a:p>
+          <a:p>
+            <a:pPr>
+              <a:defRPr/>
+            </a:pPr>
+            <a:r>
+              <a:rPr lang="es-CO" sz="1600" b="0" i="0" u="none" strike="noStrike" cap="none" spc="0">
+                <a:solidFill>
+                  <a:schemeClr val="tx1"/>
+                </a:solidFill>
+                <a:latin typeface="+mn-lt"/>
+                <a:ea typeface="+mn-ea"/>
+                <a:cs typeface="+mn-cs"/>
+              </a:rPr>
+              <a:t>git tag -a &lt;0.5&gt; -m "&lt;a&gt;"</a:t>
+            </a:r>
+            <a:endParaRPr lang="es-CO" sz="1600" b="0" i="0" u="none" strike="noStrike" cap="none" spc="0">
+              <a:solidFill>
+                <a:schemeClr val="tx1"/>
+              </a:solidFill>
+              <a:latin typeface="+mn-lt"/>
+              <a:ea typeface="+mn-ea"/>
+              <a:cs typeface="+mn-cs"/>
+            </a:endParaRPr>
+          </a:p>
+          <a:p>
+            <a:pPr>
+              <a:defRPr/>
+            </a:pPr>
+            <a:r>
+              <a:rPr lang="es-CO" sz="1600" b="0" i="0" u="none" strike="noStrike" cap="none" spc="0">
+                <a:solidFill>
+                  <a:schemeClr val="tx1"/>
+                </a:solidFill>
+                <a:latin typeface="+mn-lt"/>
+                <a:ea typeface="+mn-ea"/>
+                <a:cs typeface="+mn-cs"/>
+              </a:rPr>
+              <a:t>a: mensaje del etiquetado EJ: Punto de partida del proyecto</a:t>
+            </a:r>
+            <a:endParaRPr lang="es-CO" sz="1600" b="0" i="0" u="none" strike="noStrike" cap="none" spc="0">
+              <a:solidFill>
+                <a:schemeClr val="tx1"/>
+              </a:solidFill>
+              <a:latin typeface="+mn-lt"/>
+              <a:ea typeface="+mn-ea"/>
+              <a:cs typeface="+mn-cs"/>
+            </a:endParaRPr>
+          </a:p>
+          <a:p>
+            <a:pPr>
+              <a:defRPr/>
+            </a:pPr>
+            <a:r>
+              <a:rPr lang="es-CO" sz="1600"/>
+              <a:t>git tag &lt;a&gt;&lt;SHA-1&gt; </a:t>
+            </a:r>
+            <a:endParaRPr lang="es-CO" sz="1600"/>
+          </a:p>
+          <a:p>
+            <a:pPr>
+              <a:defRPr/>
+            </a:pPr>
+            <a:r>
+              <a:rPr lang="es-CO" sz="1600"/>
+              <a:t>a: version ej. 1.0.1</a:t>
+            </a:r>
+            <a:endParaRPr lang="es-CO" sz="1600"/>
+          </a:p>
+          <a:p>
+            <a:pPr>
+              <a:defRPr/>
+            </a:pPr>
+            <a:r>
+              <a:rPr lang="es-CO" sz="1600" b="0" i="0" u="none" strike="noStrike" cap="none" spc="0">
+                <a:solidFill>
+                  <a:schemeClr val="tx1"/>
+                </a:solidFill>
+                <a:latin typeface="Arial"/>
+                <a:ea typeface="Arial"/>
+                <a:cs typeface="Arial"/>
+              </a:rPr>
+              <a:t>git tag &lt;0.0&gt; &lt;0907438f08d7ae3fdd87ede12f18837bcc1afa9d&gt;</a:t>
+            </a:r>
+            <a:endParaRPr lang="es-CO" sz="1600"/>
+          </a:p>
+          <a:p>
+            <a:pPr>
+              <a:defRPr/>
+            </a:pPr>
+            <a:r>
+              <a:rPr lang="es-CO" sz="1600" b="0" i="0" u="none" strike="noStrike" cap="none" spc="0">
+                <a:solidFill>
+                  <a:schemeClr val="tx1"/>
+                </a:solidFill>
+                <a:latin typeface="+mn-lt"/>
+                <a:ea typeface="+mn-ea"/>
+                <a:cs typeface="+mn-cs"/>
+              </a:rPr>
+              <a:t>git tag &lt;a&gt;&lt;SHA-1&gt; </a:t>
+            </a:r>
+            <a:r>
+              <a:rPr lang="es-CO" sz="1600"/>
+              <a:t>-m &lt;b&gt;</a:t>
+            </a:r>
+            <a:endParaRPr lang="es-CO" sz="1600"/>
+          </a:p>
+          <a:p>
+            <a:pPr>
+              <a:defRPr/>
+            </a:pPr>
+            <a:r>
+              <a:rPr lang="es-CO" sz="1600"/>
+              <a:t>a:</a:t>
+            </a:r>
+            <a:r>
+              <a:rPr lang="es-CO" sz="1600" b="0" i="0" u="none" strike="noStrike" cap="none" spc="0">
+                <a:solidFill>
+                  <a:schemeClr val="tx1"/>
+                </a:solidFill>
+                <a:latin typeface="+mn-lt"/>
+                <a:ea typeface="+mn-ea"/>
+                <a:cs typeface="+mn-cs"/>
+              </a:rPr>
+              <a:t>version ej. 1.0.1</a:t>
+            </a:r>
+            <a:endParaRPr lang="es-CO" sz="1600"/>
+          </a:p>
+          <a:p>
+            <a:pPr>
+              <a:defRPr/>
+            </a:pPr>
+            <a:r>
+              <a:rPr lang="es-CO" sz="1600"/>
+              <a:t>b:mensaje del tag</a:t>
+            </a:r>
+            <a:endParaRPr lang="es-CO" sz="1600"/>
+          </a:p>
+          <a:p>
+            <a:pPr>
+              <a:defRPr/>
+            </a:pPr>
+            <a:r>
+              <a:rPr lang="es-CO" sz="1600" b="0" i="0" u="none" strike="noStrike" cap="none" spc="0">
+                <a:solidFill>
+                  <a:schemeClr val="tx1"/>
+                </a:solidFill>
+                <a:latin typeface="Arial"/>
+                <a:ea typeface="Arial"/>
+                <a:cs typeface="Arial"/>
+              </a:rPr>
+              <a:t>git tag &lt;0.0&gt; &lt;0907438f08d7ae3fdd87ede12f18837bcc1afa9d&gt; -m "&lt;Punto de partida del proyecto&gt;"</a:t>
+            </a:r>
+            <a:endParaRPr lang="es-CO" sz="1600" b="0" i="0" u="none" strike="noStrike" cap="none" spc="0">
+              <a:solidFill>
+                <a:schemeClr val="tx1"/>
+              </a:solidFill>
+              <a:latin typeface="Arial"/>
+              <a:ea typeface="Arial"/>
+              <a:cs typeface="Arial"/>
+            </a:endParaRPr>
+          </a:p>
+          <a:p>
+            <a:pPr>
+              <a:defRPr/>
+            </a:pPr>
+            <a:r>
+              <a:rPr lang="es-CO" sz="1600" b="0" i="0" u="none" strike="noStrike" cap="none" spc="0">
+                <a:solidFill>
+                  <a:schemeClr val="tx1"/>
+                </a:solidFill>
+                <a:latin typeface="Arial"/>
+                <a:ea typeface="Arial"/>
+                <a:cs typeface="Arial"/>
+              </a:rPr>
+              <a:t>lista los tags</a:t>
+            </a:r>
+            <a:endParaRPr lang="es-CO" sz="1600"/>
+          </a:p>
+          <a:p>
+            <a:pPr>
+              <a:defRPr/>
+            </a:pPr>
+            <a:r>
+              <a:rPr lang="es-CO" sz="1600"/>
+              <a:t>git tag -l </a:t>
+            </a:r>
+            <a:endParaRPr lang="es-CO" sz="1600"/>
+          </a:p>
+          <a:p>
+            <a:pPr>
+              <a:defRPr/>
+            </a:pPr>
+            <a:r>
+              <a:rPr lang="es-CO" sz="1600"/>
+              <a:t>borrar un tag</a:t>
+            </a:r>
+            <a:endParaRPr lang="es-CO" sz="1600"/>
+          </a:p>
+          <a:p>
+            <a:pPr>
+              <a:defRPr/>
+            </a:pPr>
+            <a:r>
+              <a:rPr lang="es-CO" sz="1600"/>
+              <a:t>git tag -d &lt;a&gt;</a:t>
+            </a:r>
+            <a:endParaRPr lang="es-CO" sz="1600" b="0" i="0" u="none" strike="noStrike" cap="none" spc="0">
+              <a:solidFill>
+                <a:schemeClr val="tx1"/>
+              </a:solidFill>
+              <a:latin typeface="Arial"/>
+              <a:ea typeface="Arial"/>
+              <a:cs typeface="Arial"/>
+            </a:endParaRPr>
+          </a:p>
+          <a:p>
+            <a:pPr>
+              <a:defRPr/>
+            </a:pPr>
+            <a:r>
+              <a:rPr lang="es-CO"/>
+              <a:t>a:version del tag que quiero borrar</a:t>
+            </a:r>
+            <a:endParaRPr lang="es-CO"/>
+          </a:p>
+          <a:p>
+            <a:pPr>
+              <a:defRPr/>
+            </a:pPr>
+            <a:r>
+              <a:rPr lang="es-CO"/>
+              <a:t>renombrar un tag</a:t>
+            </a:r>
+            <a:endParaRPr lang="es-CO"/>
+          </a:p>
+          <a:p>
+            <a:pPr>
+              <a:defRPr/>
+            </a:pPr>
+            <a:r>
+              <a:rPr lang="es-CO" sz="1800" b="0" i="0" u="none" strike="noStrike" cap="none" spc="0">
+                <a:solidFill>
+                  <a:schemeClr val="tx1"/>
+                </a:solidFill>
+                <a:latin typeface="Arial"/>
+                <a:ea typeface="Arial"/>
+                <a:cs typeface="Arial"/>
+              </a:rPr>
+              <a:t>git tag -f -a 0.5 -m "hasta el comando commit" 84fb8bdbce746c5a497714b68ae450fb9fdd54fb</a:t>
+            </a:r>
+            <a:endParaRPr lang="es-CO"/>
+          </a:p>
+          <a:p>
+            <a:pPr>
+              <a:defRPr/>
+            </a:pPr>
+            <a:endParaRPr lang="es-CO" sz="1800" b="0" i="0" u="none" strike="noStrike" cap="none" spc="0">
+              <a:solidFill>
+                <a:schemeClr val="tx1"/>
+              </a:solidFill>
+              <a:latin typeface="Arial"/>
+              <a:ea typeface="Arial"/>
+              <a:cs typeface="Arial"/>
+            </a:endParaRPr>
+          </a:p>
+          <a:p>
+            <a:pPr>
+              <a:defRPr/>
+            </a:pPr>
+            <a:endParaRPr lang="es-CO" sz="1800"/>
+          </a:p>
+          <a:p>
+            <a:pPr>
+              <a:defRPr/>
+            </a:pPr>
+            <a:endParaRPr lang="es-CO" sz="1800"/>
+          </a:p>
+          <a:p>
+            <a:pPr>
+              <a:defRPr/>
+            </a:pPr>
+            <a:endParaRPr lang="es-CO" sz="1800"/>
           </a:p>
         </p:txBody>
       </p:sp>

</xml_diff>

<commit_message>
edicion de comandos hasta (diff)
</commit_message>
<xml_diff>
--- a/presentasionComandos.pptx
+++ b/presentasionComandos.pptx
@@ -8,6 +8,7 @@
     <p:sldId id="256" r:id="rId3"/>
     <p:sldId id="257" r:id="rId4"/>
     <p:sldId id="258" r:id="rId5"/>
+    <p:sldId id="259" r:id="rId6"/>
   </p:sldIdLst>
   <p:sldSz cx="12192000" cy="6858000"/>
   <p:notesSz cx="6858000" cy="12192000"/>
@@ -4569,6 +4570,167 @@
 </p:sld>
 </file>
 
+<file path=ppt/slides/slide4.xml><?xml version="1.0" encoding="utf-8"?>
+<p:sld xmlns:a="http://schemas.openxmlformats.org/drawingml/2006/main" xmlns:r="http://schemas.openxmlformats.org/officeDocument/2006/relationships" xmlns:p="http://schemas.openxmlformats.org/presentationml/2006/main" xmlns:m="http://schemas.openxmlformats.org/officeDocument/2006/math" xmlns:w="http://schemas.openxmlformats.org/wordprocessingml/2006/main" showMasterPhAnim="0" show="1">
+  <p:cSld name="">
+    <p:bg>
+      <p:bgPr shadeToTitle="0">
+        <a:solidFill>
+          <a:schemeClr val="accent1"/>
+        </a:solidFill>
+      </p:bgPr>
+    </p:bg>
+    <p:spTree>
+      <p:nvGrpSpPr>
+        <p:cNvPr id="1" name="" hidden="0"/>
+        <p:cNvGrpSpPr/>
+        <p:nvPr isPhoto="0" userDrawn="0"/>
+      </p:nvGrpSpPr>
+      <p:grpSpPr bwMode="auto">
+        <a:xfrm>
+          <a:off x="0" y="0"/>
+          <a:ext cx="0" cy="0"/>
+          <a:chOff x="0" y="0"/>
+          <a:chExt cx="0" cy="0"/>
+        </a:xfrm>
+      </p:grpSpPr>
+      <p:sp>
+        <p:nvSpPr>
+          <p:cNvPr id="4" name="" hidden="0"/>
+          <p:cNvSpPr/>
+          <p:nvPr isPhoto="0" userDrawn="0"/>
+        </p:nvSpPr>
+        <p:spPr bwMode="auto">
+          <a:xfrm flipH="0" flipV="0">
+            <a:off x="829521" y="700367"/>
+            <a:ext cx="10548076" cy="5463667"/>
+          </a:xfrm>
+          <a:prstGeom prst="rect">
+            <a:avLst/>
+          </a:prstGeom>
+          <a:noFill/>
+        </p:spPr>
+        <p:txBody>
+          <a:bodyPr vertOverflow="overflow" horzOverflow="clip" vert="horz" wrap="square" lIns="91440" tIns="45720" rIns="91440" bIns="45720" numCol="1" spcCol="0" rtlCol="0" fromWordArt="0" anchor="t" anchorCtr="0" forceAA="0" upright="0" compatLnSpc="0">
+            <a:noAutofit/>
+          </a:bodyPr>
+          <a:p>
+            <a:pPr>
+              <a:defRPr/>
+            </a:pPr>
+            <a:r>
+              <a:rPr lang="es-CO"/>
+              <a:t>DIFERENCIAS</a:t>
+            </a:r>
+            <a:endParaRPr lang="es-CO"/>
+          </a:p>
+          <a:p>
+            <a:pPr>
+              <a:defRPr/>
+            </a:pPr>
+            <a:r>
+              <a:rPr lang="es-CO"/>
+              <a:t>ver las diferencias de la ubicacion actual con el HASH especificado</a:t>
+            </a:r>
+            <a:endParaRPr lang="es-CO"/>
+          </a:p>
+          <a:p>
+            <a:pPr>
+              <a:defRPr/>
+            </a:pPr>
+            <a:r>
+              <a:rPr lang="es-CO"/>
+              <a:t>git diff &lt;SHA1&gt;</a:t>
+            </a:r>
+            <a:endParaRPr lang="es-CO"/>
+          </a:p>
+          <a:p>
+            <a:pPr>
+              <a:defRPr/>
+            </a:pPr>
+            <a:r>
+              <a:rPr lang="es-CO"/>
+              <a:t>comparar especificando los dos puntos, se pueden ivertir el orden de comparacion</a:t>
+            </a:r>
+            <a:endParaRPr lang="es-CO"/>
+          </a:p>
+          <a:p>
+            <a:pPr>
+              <a:defRPr/>
+            </a:pPr>
+            <a:r>
+              <a:rPr lang="es-CO" sz="1800" b="0" i="0" u="none" strike="noStrike" cap="none" spc="0">
+                <a:solidFill>
+                  <a:schemeClr val="tx1"/>
+                </a:solidFill>
+                <a:latin typeface="+mn-lt"/>
+                <a:ea typeface="+mn-ea"/>
+                <a:cs typeface="+mn-cs"/>
+              </a:rPr>
+              <a:t>git diff &lt;SHA1&gt;</a:t>
+            </a:r>
+            <a:r>
+              <a:rPr lang="es-CO" sz="1800" b="0" i="0" u="none" strike="noStrike" cap="none" spc="0">
+                <a:solidFill>
+                  <a:schemeClr val="tx1"/>
+                </a:solidFill>
+                <a:latin typeface="+mn-lt"/>
+                <a:ea typeface="+mn-ea"/>
+                <a:cs typeface="+mn-cs"/>
+              </a:rPr>
+              <a:t>&lt;SHA1&gt;</a:t>
+            </a:r>
+            <a:endParaRPr lang="es-CO"/>
+          </a:p>
+          <a:p>
+            <a:pPr>
+              <a:defRPr/>
+            </a:pPr>
+            <a:endParaRPr lang="es-CO" sz="1800" b="0" i="0" u="none" strike="noStrike" cap="none" spc="0">
+              <a:solidFill>
+                <a:schemeClr val="tx1"/>
+              </a:solidFill>
+              <a:latin typeface="Arial"/>
+              <a:ea typeface="Arial"/>
+              <a:cs typeface="Arial"/>
+            </a:endParaRPr>
+          </a:p>
+          <a:p>
+            <a:pPr>
+              <a:defRPr/>
+            </a:pPr>
+            <a:endParaRPr lang="es-CO" sz="1800"/>
+          </a:p>
+          <a:p>
+            <a:pPr>
+              <a:defRPr/>
+            </a:pPr>
+            <a:endParaRPr lang="es-CO" sz="1800"/>
+          </a:p>
+          <a:p>
+            <a:pPr>
+              <a:defRPr/>
+            </a:pPr>
+            <a:endParaRPr lang="es-CO" sz="1800"/>
+          </a:p>
+        </p:txBody>
+      </p:sp>
+    </p:spTree>
+  </p:cSld>
+  <p:clrMapOvr>
+    <a:masterClrMapping/>
+  </p:clrMapOvr>
+  <mc:AlternateContent xmlns:mc="http://schemas.openxmlformats.org/markup-compatibility/2006">
+    <mc:Choice xmlns:p14="http://schemas.microsoft.com/office/powerpoint/2010/main" Requires="p14">
+      <p:transition p14:dur="2000" advClick="1"/>
+    </mc:Choice>
+    <mc:Fallback>
+      <p:transition advClick="1"/>
+    </mc:Fallback>
+  </mc:AlternateContent>
+</p:sld>
+</file>
+
 <file path=ppt/theme/theme1.xml><?xml version="1.0" encoding="utf-8"?>
 <a:theme xmlns:a="http://schemas.openxmlformats.org/drawingml/2006/main" xmlns:r="http://schemas.openxmlformats.org/officeDocument/2006/relationships" xmlns:p="http://schemas.openxmlformats.org/presentationml/2006/main" name="Blank">
   <a:themeElements>

</xml_diff>

<commit_message>
edicion de comandos hasta (reset --mixed)
</commit_message>
<xml_diff>
--- a/presentasionComandos.pptx
+++ b/presentasionComandos.pptx
@@ -3635,7 +3635,55 @@
               </a:rPr>
               <a:t>STAGE</a:t>
             </a:r>
-            <a:endParaRPr sz="1600"/>
+            <a:endParaRPr lang="es-CO" sz="1600" b="0" i="0" u="none" strike="noStrike" cap="none" spc="0">
+              <a:solidFill>
+                <a:schemeClr val="tx1"/>
+              </a:solidFill>
+              <a:latin typeface="+mn-lt"/>
+              <a:ea typeface="+mn-ea"/>
+              <a:cs typeface="+mn-cs"/>
+            </a:endParaRPr>
+          </a:p>
+          <a:p>
+            <a:pPr>
+              <a:defRPr/>
+            </a:pPr>
+            <a:r>
+              <a:rPr lang="es-CO" sz="1600" b="0" i="0" u="none" strike="noStrike" cap="none" spc="0">
+                <a:solidFill>
+                  <a:schemeClr val="tx1"/>
+                </a:solidFill>
+                <a:latin typeface="Arial"/>
+                <a:ea typeface="Arial"/>
+                <a:cs typeface="Arial"/>
+              </a:rPr>
+              <a:t>git restore --staged &lt;a&gt;</a:t>
+            </a:r>
+            <a:endParaRPr lang="es-CO" sz="1600" b="0" i="0" u="none" strike="noStrike" cap="none" spc="0">
+              <a:solidFill>
+                <a:schemeClr val="tx1"/>
+              </a:solidFill>
+              <a:latin typeface="Arial"/>
+              <a:ea typeface="Arial"/>
+              <a:cs typeface="Arial"/>
+            </a:endParaRPr>
+          </a:p>
+          <a:p>
+            <a:pPr>
+              <a:defRPr/>
+            </a:pPr>
+            <a:r>
+              <a:rPr lang="es-CO" sz="1600" b="0" i="0" u="none" strike="noStrike" cap="none" spc="0">
+                <a:solidFill>
+                  <a:schemeClr val="tx1"/>
+                </a:solidFill>
+                <a:latin typeface="Arial"/>
+                <a:ea typeface="Arial"/>
+                <a:cs typeface="Arial"/>
+              </a:rPr>
+              <a:t>a: nombre del archivo que quiero borrar de stage</a:t>
+            </a:r>
+            <a:endParaRPr lang="es-CO" sz="1600"/>
           </a:p>
           <a:p>
             <a:pPr>
@@ -4686,6 +4734,161 @@
             <a:pPr>
               <a:defRPr/>
             </a:pPr>
+            <a:r>
+              <a:rPr lang="es-CO" sz="1800" b="0" i="0" u="none" strike="noStrike" cap="none" spc="0">
+                <a:solidFill>
+                  <a:schemeClr val="tx1"/>
+                </a:solidFill>
+                <a:latin typeface="+mn-lt"/>
+                <a:ea typeface="+mn-ea"/>
+                <a:cs typeface="+mn-cs"/>
+              </a:rPr>
+              <a:t>RESET SUAVE SOFT</a:t>
+            </a:r>
+            <a:endParaRPr lang="es-CO" sz="1800" b="0" i="0" u="none" strike="noStrike" cap="none" spc="0">
+              <a:solidFill>
+                <a:schemeClr val="tx1"/>
+              </a:solidFill>
+              <a:latin typeface="+mn-lt"/>
+              <a:ea typeface="+mn-ea"/>
+              <a:cs typeface="+mn-cs"/>
+            </a:endParaRPr>
+          </a:p>
+          <a:p>
+            <a:pPr>
+              <a:defRPr/>
+            </a:pPr>
+            <a:r>
+              <a:rPr lang="es-CO" sz="1800" b="0" i="0" u="none" strike="noStrike" cap="none" spc="0">
+                <a:solidFill>
+                  <a:schemeClr val="tx1"/>
+                </a:solidFill>
+                <a:latin typeface="+mn-lt"/>
+                <a:ea typeface="+mn-ea"/>
+                <a:cs typeface="+mn-cs"/>
+              </a:rPr>
+              <a:t>resetear los cambios y dejarlos en el stage</a:t>
+            </a:r>
+            <a:endParaRPr lang="es-CO" sz="1800" b="0" i="0" u="none" strike="noStrike" cap="none" spc="0">
+              <a:solidFill>
+                <a:schemeClr val="tx1"/>
+              </a:solidFill>
+              <a:latin typeface="+mn-lt"/>
+              <a:ea typeface="+mn-ea"/>
+              <a:cs typeface="+mn-cs"/>
+            </a:endParaRPr>
+          </a:p>
+          <a:p>
+            <a:pPr>
+              <a:defRPr/>
+            </a:pPr>
+            <a:r>
+              <a:rPr lang="es-CO" sz="1800" b="0" i="0" u="none" strike="noStrike" cap="none" spc="0">
+                <a:solidFill>
+                  <a:schemeClr val="tx1"/>
+                </a:solidFill>
+                <a:latin typeface="+mn-lt"/>
+                <a:ea typeface="+mn-ea"/>
+                <a:cs typeface="+mn-cs"/>
+              </a:rPr>
+              <a:t>git reset --soft &lt;a&gt;</a:t>
+            </a:r>
+            <a:endParaRPr lang="es-CO" sz="1800" b="0" i="0" u="none" strike="noStrike" cap="none" spc="0">
+              <a:solidFill>
+                <a:schemeClr val="tx1"/>
+              </a:solidFill>
+              <a:latin typeface="+mn-lt"/>
+              <a:ea typeface="+mn-ea"/>
+              <a:cs typeface="+mn-cs"/>
+            </a:endParaRPr>
+          </a:p>
+          <a:p>
+            <a:pPr>
+              <a:defRPr/>
+            </a:pPr>
+            <a:r>
+              <a:rPr lang="es-CO" sz="1800" b="0" i="0" u="none" strike="noStrike" cap="none" spc="0">
+                <a:solidFill>
+                  <a:schemeClr val="tx1"/>
+                </a:solidFill>
+                <a:latin typeface="+mn-lt"/>
+                <a:ea typeface="+mn-ea"/>
+                <a:cs typeface="+mn-cs"/>
+              </a:rPr>
+              <a:t>a: SHA1,a partir de este punto se van a borrar los comits este SAH1 queda como head</a:t>
+            </a:r>
+            <a:endParaRPr lang="es-CO" sz="1800" b="0" i="0" u="none" strike="noStrike" cap="none" spc="0">
+              <a:solidFill>
+                <a:schemeClr val="tx1"/>
+              </a:solidFill>
+              <a:latin typeface="+mn-lt"/>
+              <a:ea typeface="+mn-ea"/>
+              <a:cs typeface="+mn-cs"/>
+            </a:endParaRPr>
+          </a:p>
+          <a:p>
+            <a:pPr>
+              <a:defRPr/>
+            </a:pPr>
+            <a:r>
+              <a:rPr lang="es-CO" sz="1800" b="0" i="0" u="none" strike="noStrike" cap="none" spc="0">
+                <a:solidFill>
+                  <a:schemeClr val="tx1"/>
+                </a:solidFill>
+                <a:latin typeface="+mn-lt"/>
+                <a:ea typeface="+mn-ea"/>
+                <a:cs typeface="+mn-cs"/>
+              </a:rPr>
+              <a:t>pasar del repositorio local al area de trabajo sin pasar por el stage</a:t>
+            </a:r>
+            <a:endParaRPr lang="es-CO" sz="1800" b="0" i="0" u="none" strike="noStrike" cap="none" spc="0">
+              <a:solidFill>
+                <a:schemeClr val="tx1"/>
+              </a:solidFill>
+              <a:latin typeface="+mn-lt"/>
+              <a:ea typeface="+mn-ea"/>
+              <a:cs typeface="+mn-cs"/>
+            </a:endParaRPr>
+          </a:p>
+          <a:p>
+            <a:pPr>
+              <a:defRPr/>
+            </a:pPr>
+            <a:r>
+              <a:rPr lang="es-CO" sz="1800" b="0" i="0" u="none" strike="noStrike" cap="none" spc="0">
+                <a:solidFill>
+                  <a:schemeClr val="tx1"/>
+                </a:solidFill>
+                <a:latin typeface="+mn-lt"/>
+                <a:ea typeface="+mn-ea"/>
+                <a:cs typeface="+mn-cs"/>
+              </a:rPr>
+              <a:t>git reset --mixed &lt;a&gt;</a:t>
+            </a:r>
+            <a:endParaRPr lang="es-CO" sz="1800" b="0" i="0" u="none" strike="noStrike" cap="none" spc="0">
+              <a:solidFill>
+                <a:schemeClr val="tx1"/>
+              </a:solidFill>
+              <a:latin typeface="+mn-lt"/>
+              <a:ea typeface="+mn-ea"/>
+              <a:cs typeface="+mn-cs"/>
+            </a:endParaRPr>
+          </a:p>
+          <a:p>
+            <a:pPr>
+              <a:defRPr/>
+            </a:pPr>
+            <a:r>
+              <a:rPr lang="es-CO" sz="1800" b="0" i="0" u="none" strike="noStrike" cap="none" spc="0">
+                <a:solidFill>
+                  <a:schemeClr val="tx1"/>
+                </a:solidFill>
+                <a:latin typeface="+mn-lt"/>
+                <a:ea typeface="+mn-ea"/>
+                <a:cs typeface="+mn-cs"/>
+              </a:rPr>
+              <a:t>a: SHA1 a partir de este punto se borran los cambios y todo queda en el area de trabajo</a:t>
+            </a:r>
             <a:endParaRPr lang="es-CO" sz="1800" b="0" i="0" u="none" strike="noStrike" cap="none" spc="0">
               <a:solidFill>
                 <a:schemeClr val="tx1"/>

</xml_diff>

<commit_message>
edicion de comandos hasta (reset --hard)
</commit_message>
<xml_diff>
--- a/presentasionComandos.pptx
+++ b/presentasionComandos.pptx
@@ -3275,7 +3275,7 @@
         <p:spPr bwMode="auto">
           <a:xfrm flipH="0" flipV="0">
             <a:off x="1053639" y="1671287"/>
-            <a:ext cx="10374477" cy="4236755"/>
+            <a:ext cx="10377033" cy="4480596"/>
           </a:xfrm>
           <a:prstGeom prst="rect">
             <a:avLst/>
@@ -3361,7 +3361,17 @@
               <a:rPr lang="es-CO" sz="1600"/>
               <a:t>git config --global color.ui true</a:t>
             </a:r>
-            <a:endParaRPr sz="1600"/>
+            <a:endParaRPr lang="es-CO" sz="1600"/>
+          </a:p>
+          <a:p>
+            <a:pPr marL="0" indent="0">
+              <a:defRPr/>
+            </a:pPr>
+            <a:r>
+              <a:rPr lang="es-CO" sz="1600"/>
+              <a:t>git config --global core.editor &lt;neovim,atom.  --wait&gt;</a:t>
+            </a:r>
+            <a:endParaRPr lang="es-CO" sz="1600"/>
           </a:p>
           <a:p>
             <a:pPr marL="0" indent="0">
@@ -4889,6 +4899,141 @@
               </a:rPr>
               <a:t>a: SHA1 a partir de este punto se borran los cambios y todo queda en el area de trabajo</a:t>
             </a:r>
+            <a:endParaRPr lang="es-CO" sz="1800" b="0" i="0" u="none" strike="noStrike" cap="none" spc="0">
+              <a:solidFill>
+                <a:schemeClr val="tx1"/>
+              </a:solidFill>
+              <a:latin typeface="+mn-lt"/>
+              <a:ea typeface="+mn-ea"/>
+              <a:cs typeface="+mn-cs"/>
+            </a:endParaRPr>
+          </a:p>
+          <a:p>
+            <a:pPr>
+              <a:defRPr/>
+            </a:pPr>
+            <a:endParaRPr lang="es-CO" sz="1800" b="0" i="0" u="none" strike="noStrike" cap="none" spc="0">
+              <a:solidFill>
+                <a:schemeClr val="tx1"/>
+              </a:solidFill>
+              <a:latin typeface="Arial"/>
+              <a:ea typeface="Arial"/>
+              <a:cs typeface="Arial"/>
+            </a:endParaRPr>
+          </a:p>
+          <a:p>
+            <a:pPr>
+              <a:defRPr/>
+            </a:pPr>
+            <a:r>
+              <a:rPr lang="es-CO" sz="1800" b="0" i="0" u="none" strike="noStrike" cap="none" spc="0">
+                <a:solidFill>
+                  <a:schemeClr val="tx1"/>
+                </a:solidFill>
+                <a:latin typeface="Arial"/>
+                <a:ea typeface="Arial"/>
+                <a:cs typeface="Arial"/>
+              </a:rPr>
+              <a:t>RESET DURO PELIGROSO HARD</a:t>
+            </a:r>
+            <a:endParaRPr lang="es-CO" sz="1800" b="0" i="0" u="none" strike="noStrike" cap="none" spc="0">
+              <a:solidFill>
+                <a:schemeClr val="tx1"/>
+              </a:solidFill>
+              <a:latin typeface="Arial"/>
+              <a:ea typeface="Arial"/>
+              <a:cs typeface="Arial"/>
+            </a:endParaRPr>
+          </a:p>
+          <a:p>
+            <a:pPr>
+              <a:defRPr/>
+            </a:pPr>
+            <a:r>
+              <a:rPr lang="es-CO" sz="1800" b="0" i="0" u="none" strike="noStrike" cap="none" spc="0">
+                <a:solidFill>
+                  <a:schemeClr val="tx1"/>
+                </a:solidFill>
+                <a:latin typeface="Arial"/>
+                <a:ea typeface="Arial"/>
+                <a:cs typeface="Arial"/>
+              </a:rPr>
+              <a:t>git reset --hard esto borra definitivamente los archivos que esten en la jurisdiccion e GIT</a:t>
+            </a:r>
+            <a:endParaRPr lang="es-CO" sz="1800" b="0" i="0" u="none" strike="noStrike" cap="none" spc="0">
+              <a:solidFill>
+                <a:schemeClr val="tx1"/>
+              </a:solidFill>
+              <a:latin typeface="Arial"/>
+              <a:ea typeface="Arial"/>
+              <a:cs typeface="Arial"/>
+            </a:endParaRPr>
+          </a:p>
+          <a:p>
+            <a:pPr>
+              <a:defRPr/>
+            </a:pPr>
+            <a:endParaRPr lang="es-CO" sz="1800" b="0" i="0" u="none" strike="noStrike" cap="none" spc="0">
+              <a:solidFill>
+                <a:schemeClr val="tx1"/>
+              </a:solidFill>
+              <a:latin typeface="Arial"/>
+              <a:ea typeface="Arial"/>
+              <a:cs typeface="Arial"/>
+            </a:endParaRPr>
+          </a:p>
+          <a:p>
+            <a:pPr>
+              <a:defRPr/>
+            </a:pPr>
+            <a:r>
+              <a:rPr lang="es-CO" sz="1800" b="0" i="0" u="none" strike="noStrike" cap="none" spc="0">
+                <a:solidFill>
+                  <a:schemeClr val="tx1"/>
+                </a:solidFill>
+                <a:latin typeface="Arial"/>
+                <a:ea typeface="Arial"/>
+                <a:cs typeface="Arial"/>
+              </a:rPr>
+              <a:t>git reset --hard &lt;a&gt;</a:t>
+            </a:r>
+            <a:endParaRPr lang="es-CO" sz="1800" b="0" i="0" u="none" strike="noStrike" cap="none" spc="0">
+              <a:solidFill>
+                <a:schemeClr val="tx1"/>
+              </a:solidFill>
+              <a:latin typeface="Arial"/>
+              <a:ea typeface="Arial"/>
+              <a:cs typeface="Arial"/>
+            </a:endParaRPr>
+          </a:p>
+          <a:p>
+            <a:pPr>
+              <a:defRPr/>
+            </a:pPr>
+            <a:r>
+              <a:rPr lang="es-CO" sz="1800" b="0" i="0" u="none" strike="noStrike" cap="none" spc="0">
+                <a:solidFill>
+                  <a:schemeClr val="tx1"/>
+                </a:solidFill>
+                <a:latin typeface="Arial"/>
+                <a:ea typeface="Arial"/>
+                <a:cs typeface="Arial"/>
+              </a:rPr>
+              <a:t>a: SHA1 se va hasta ese punto y borra todo lo demas definitivamente , es mejor antes de utilizarlo listar los SAH1 de los comits antes de ejecutarlo y no cerrarla hasta estar seguros.</a:t>
+            </a:r>
+            <a:endParaRPr lang="es-CO" sz="1800" b="0" i="0" u="none" strike="noStrike" cap="none" spc="0">
+              <a:solidFill>
+                <a:schemeClr val="tx1"/>
+              </a:solidFill>
+              <a:latin typeface="Arial"/>
+              <a:ea typeface="Arial"/>
+              <a:cs typeface="Arial"/>
+            </a:endParaRPr>
+          </a:p>
+          <a:p>
+            <a:pPr>
+              <a:defRPr/>
+            </a:pPr>
             <a:endParaRPr lang="es-CO" sz="1800" b="0" i="0" u="none" strike="noStrike" cap="none" spc="0">
               <a:solidFill>
                 <a:schemeClr val="tx1"/>

</xml_diff>

<commit_message>
modificacionde comandos hasta (branch)
</commit_message>
<xml_diff>
--- a/presentasionComandos.pptx
+++ b/presentasionComandos.pptx
@@ -9,6 +9,7 @@
     <p:sldId id="257" r:id="rId4"/>
     <p:sldId id="258" r:id="rId5"/>
     <p:sldId id="259" r:id="rId6"/>
+    <p:sldId id="260" r:id="rId7"/>
   </p:sldIdLst>
   <p:sldSz cx="12192000" cy="6858000"/>
   <p:notesSz cx="6858000" cy="12192000"/>
@@ -5079,6 +5080,265 @@
 </p:sld>
 </file>
 
+<file path=ppt/slides/slide5.xml><?xml version="1.0" encoding="utf-8"?>
+<p:sld xmlns:a="http://schemas.openxmlformats.org/drawingml/2006/main" xmlns:r="http://schemas.openxmlformats.org/officeDocument/2006/relationships" xmlns:p="http://schemas.openxmlformats.org/presentationml/2006/main" xmlns:m="http://schemas.openxmlformats.org/officeDocument/2006/math" xmlns:w="http://schemas.openxmlformats.org/wordprocessingml/2006/main" showMasterPhAnim="0" show="1">
+  <p:cSld name="">
+    <p:bg>
+      <p:bgPr shadeToTitle="0">
+        <a:solidFill>
+          <a:schemeClr val="accent1"/>
+        </a:solidFill>
+      </p:bgPr>
+    </p:bg>
+    <p:spTree>
+      <p:nvGrpSpPr>
+        <p:cNvPr id="1" name="" hidden="0"/>
+        <p:cNvGrpSpPr/>
+        <p:nvPr isPhoto="0" userDrawn="0"/>
+      </p:nvGrpSpPr>
+      <p:grpSpPr bwMode="auto">
+        <a:xfrm>
+          <a:off x="0" y="0"/>
+          <a:ext cx="0" cy="0"/>
+          <a:chOff x="0" y="0"/>
+          <a:chExt cx="0" cy="0"/>
+        </a:xfrm>
+      </p:grpSpPr>
+      <p:sp>
+        <p:nvSpPr>
+          <p:cNvPr id="4" name="" hidden="0"/>
+          <p:cNvSpPr/>
+          <p:nvPr isPhoto="0" userDrawn="0"/>
+        </p:nvSpPr>
+        <p:spPr bwMode="auto">
+          <a:xfrm flipH="0" flipV="0">
+            <a:off x="829521" y="700367"/>
+            <a:ext cx="10548076" cy="5463667"/>
+          </a:xfrm>
+          <a:prstGeom prst="rect">
+            <a:avLst/>
+          </a:prstGeom>
+          <a:noFill/>
+        </p:spPr>
+        <p:txBody>
+          <a:bodyPr vertOverflow="overflow" horzOverflow="clip" vert="horz" wrap="square" lIns="91440" tIns="45720" rIns="91440" bIns="45720" numCol="1" spcCol="0" rtlCol="0" fromWordArt="0" anchor="t" anchorCtr="0" forceAA="0" upright="0" compatLnSpc="0">
+            <a:noAutofit/>
+          </a:bodyPr>
+          <a:p>
+            <a:pPr>
+              <a:defRPr/>
+            </a:pPr>
+            <a:r>
+              <a:rPr lang="es-CO"/>
+              <a:t>RAMAS </a:t>
+            </a:r>
+            <a:endParaRPr lang="es-CO"/>
+          </a:p>
+          <a:p>
+            <a:pPr>
+              <a:defRPr/>
+            </a:pPr>
+            <a:r>
+              <a:rPr lang="es-CO"/>
+              <a:t>crear una rama</a:t>
+            </a:r>
+            <a:endParaRPr lang="es-CO"/>
+          </a:p>
+          <a:p>
+            <a:pPr>
+              <a:defRPr/>
+            </a:pPr>
+            <a:r>
+              <a:rPr lang="es-CO"/>
+              <a:t>git branch &lt;a&gt;</a:t>
+            </a:r>
+            <a:endParaRPr lang="es-CO"/>
+          </a:p>
+          <a:p>
+            <a:pPr>
+              <a:defRPr/>
+            </a:pPr>
+            <a:r>
+              <a:rPr lang="es-CO"/>
+              <a:t>a: nombre de la rama que quiero crear</a:t>
+            </a:r>
+            <a:endParaRPr lang="es-CO"/>
+          </a:p>
+          <a:p>
+            <a:pPr>
+              <a:defRPr/>
+            </a:pPr>
+            <a:r>
+              <a:rPr lang="es-CO"/>
+              <a:t>listar las ramas </a:t>
+            </a:r>
+            <a:endParaRPr lang="es-CO"/>
+          </a:p>
+          <a:p>
+            <a:pPr>
+              <a:defRPr/>
+            </a:pPr>
+            <a:r>
+              <a:rPr lang="es-CO"/>
+              <a:t>git branch -l</a:t>
+            </a:r>
+            <a:endParaRPr lang="es-CO"/>
+          </a:p>
+          <a:p>
+            <a:pPr>
+              <a:defRPr/>
+            </a:pPr>
+            <a:r>
+              <a:rPr lang="es-CO"/>
+              <a:t>borrar rama</a:t>
+            </a:r>
+            <a:endParaRPr lang="es-CO"/>
+          </a:p>
+          <a:p>
+            <a:pPr>
+              <a:defRPr/>
+            </a:pPr>
+            <a:r>
+              <a:rPr lang="es-CO"/>
+              <a:t>git branch -d &lt;a&gt;</a:t>
+            </a:r>
+            <a:endParaRPr lang="es-CO"/>
+          </a:p>
+          <a:p>
+            <a:pPr>
+              <a:defRPr/>
+            </a:pPr>
+            <a:r>
+              <a:rPr lang="es-CO"/>
+              <a:t>a: nombre de la rama a borrar</a:t>
+            </a:r>
+            <a:endParaRPr lang="es-CO"/>
+          </a:p>
+          <a:p>
+            <a:pPr>
+              <a:defRPr/>
+            </a:pPr>
+            <a:r>
+              <a:rPr lang="es-CO"/>
+              <a:t>forzar el borrado de una rama </a:t>
+            </a:r>
+            <a:endParaRPr lang="es-CO"/>
+          </a:p>
+          <a:p>
+            <a:pPr>
+              <a:defRPr/>
+            </a:pPr>
+            <a:r>
+              <a:rPr lang="es-CO"/>
+              <a:t>git branch -D &lt;a&gt;</a:t>
+            </a:r>
+            <a:endParaRPr lang="es-CO"/>
+          </a:p>
+          <a:p>
+            <a:pPr>
+              <a:defRPr/>
+            </a:pPr>
+            <a:r>
+              <a:rPr lang="es-CO"/>
+              <a:t>a: nombre de la rama  borrar</a:t>
+            </a:r>
+            <a:endParaRPr lang="es-CO"/>
+          </a:p>
+          <a:p>
+            <a:pPr>
+              <a:defRPr/>
+            </a:pPr>
+            <a:r>
+              <a:rPr lang="es-CO"/>
+              <a:t>renombrar rama </a:t>
+            </a:r>
+            <a:endParaRPr lang="es-CO"/>
+          </a:p>
+          <a:p>
+            <a:pPr>
+              <a:defRPr/>
+            </a:pPr>
+            <a:r>
+              <a:rPr lang="es-CO"/>
+              <a:t>git branch -m &lt;a&gt;&lt;b&gt;</a:t>
+            </a:r>
+            <a:endParaRPr lang="es-CO"/>
+          </a:p>
+          <a:p>
+            <a:pPr>
+              <a:defRPr/>
+            </a:pPr>
+            <a:r>
+              <a:rPr lang="es-CO"/>
+              <a:t>a:nombre de la rama que quiero renombrar</a:t>
+            </a:r>
+            <a:endParaRPr lang="es-CO"/>
+          </a:p>
+          <a:p>
+            <a:pPr>
+              <a:defRPr/>
+            </a:pPr>
+            <a:r>
+              <a:rPr lang="es-CO"/>
+              <a:t>b:nuevo nombre de la rama</a:t>
+            </a:r>
+            <a:endParaRPr lang="es-CO"/>
+          </a:p>
+          <a:p>
+            <a:pPr>
+              <a:defRPr/>
+            </a:pPr>
+            <a:endParaRPr lang="es-CO"/>
+          </a:p>
+          <a:p>
+            <a:pPr>
+              <a:defRPr/>
+            </a:pPr>
+            <a:endParaRPr lang="es-CO" sz="1800" b="0" i="0" u="none" strike="noStrike" cap="none" spc="0">
+              <a:solidFill>
+                <a:schemeClr val="tx1"/>
+              </a:solidFill>
+              <a:latin typeface="Arial"/>
+              <a:ea typeface="Arial"/>
+              <a:cs typeface="Arial"/>
+            </a:endParaRPr>
+          </a:p>
+          <a:p>
+            <a:pPr>
+              <a:defRPr/>
+            </a:pPr>
+            <a:endParaRPr lang="es-CO" sz="1800"/>
+          </a:p>
+          <a:p>
+            <a:pPr>
+              <a:defRPr/>
+            </a:pPr>
+            <a:endParaRPr lang="es-CO" sz="1800"/>
+          </a:p>
+          <a:p>
+            <a:pPr>
+              <a:defRPr/>
+            </a:pPr>
+            <a:endParaRPr lang="es-CO" sz="1800"/>
+          </a:p>
+        </p:txBody>
+      </p:sp>
+    </p:spTree>
+  </p:cSld>
+  <p:clrMapOvr>
+    <a:masterClrMapping/>
+  </p:clrMapOvr>
+  <mc:AlternateContent xmlns:mc="http://schemas.openxmlformats.org/markup-compatibility/2006">
+    <mc:Choice xmlns:p14="http://schemas.microsoft.com/office/powerpoint/2010/main" Requires="p14">
+      <p:transition p14:dur="2000" advClick="1"/>
+    </mc:Choice>
+    <mc:Fallback>
+      <p:transition advClick="1"/>
+    </mc:Fallback>
+  </mc:AlternateContent>
+</p:sld>
+</file>
+
 <file path=ppt/theme/theme1.xml><?xml version="1.0" encoding="utf-8"?>
 <a:theme xmlns:a="http://schemas.openxmlformats.org/drawingml/2006/main" xmlns:r="http://schemas.openxmlformats.org/officeDocument/2006/relationships" xmlns:p="http://schemas.openxmlformats.org/presentationml/2006/main" name="Blank">
   <a:themeElements>

</xml_diff>

<commit_message>
cambios en los comandos hasta (rebase)
</commit_message>
<xml_diff>
--- a/presentasionComandos.pptx
+++ b/presentasionComandos.pptx
@@ -5520,6 +5520,37 @@
             <a:pPr>
               <a:defRPr/>
             </a:pPr>
+            <a:r>
+              <a:rPr lang="es-CO"/>
+              <a:t>git rebase &lt;a&gt;/</a:t>
+            </a:r>
+            <a:r>
+              <a:rPr lang="es-CO" sz="1800" b="0" i="0" u="none" strike="noStrike" cap="none" spc="0">
+                <a:solidFill>
+                  <a:schemeClr val="tx1"/>
+                </a:solidFill>
+                <a:latin typeface="+mn-lt"/>
+                <a:ea typeface="+mn-ea"/>
+                <a:cs typeface="+mn-cs"/>
+              </a:rPr>
+              <a:t>git rebase -i &lt;a&gt;</a:t>
+            </a:r>
+            <a:endParaRPr lang="es-CO"/>
+          </a:p>
+          <a:p>
+            <a:pPr>
+              <a:defRPr/>
+            </a:pPr>
+            <a:r>
+              <a:rPr lang="es-CO"/>
+              <a:t>a:nombre de la rama que quiero mezclar sin hacer bifurcaciones</a:t>
+            </a:r>
+            <a:endParaRPr lang="es-CO"/>
+          </a:p>
+          <a:p>
+            <a:pPr>
+              <a:defRPr/>
+            </a:pPr>
             <a:endParaRPr lang="es-CO"/>
           </a:p>
           <a:p>

</xml_diff>

<commit_message>
cambio en los comandos hasta (stash)pptx
</commit_message>
<xml_diff>
--- a/presentasionComandos.pptx
+++ b/presentasionComandos.pptx
@@ -5551,6 +5551,111 @@
             <a:pPr>
               <a:defRPr/>
             </a:pPr>
+            <a:r>
+              <a:rPr lang="es-CO"/>
+              <a:t>guardar cambios temporales</a:t>
+            </a:r>
+            <a:endParaRPr lang="es-CO"/>
+          </a:p>
+          <a:p>
+            <a:pPr>
+              <a:defRPr/>
+            </a:pPr>
+            <a:r>
+              <a:rPr lang="es-CO"/>
+              <a:t>git stash</a:t>
+            </a:r>
+            <a:endParaRPr lang="es-CO"/>
+          </a:p>
+          <a:p>
+            <a:pPr>
+              <a:defRPr/>
+            </a:pPr>
+            <a:r>
+              <a:rPr lang="es-CO"/>
+              <a:t>ver la lista de cambios temporales</a:t>
+            </a:r>
+            <a:endParaRPr lang="es-CO"/>
+          </a:p>
+          <a:p>
+            <a:pPr>
+              <a:defRPr/>
+            </a:pPr>
+            <a:r>
+              <a:rPr lang="es-CO"/>
+              <a:t>git stash list</a:t>
+            </a:r>
+            <a:endParaRPr lang="es-CO"/>
+          </a:p>
+          <a:p>
+            <a:pPr>
+              <a:defRPr/>
+            </a:pPr>
+            <a:r>
+              <a:rPr lang="es-CO"/>
+              <a:t>retomar un cambio realizado del stash</a:t>
+            </a:r>
+            <a:endParaRPr lang="es-CO"/>
+          </a:p>
+          <a:p>
+            <a:pPr>
+              <a:defRPr/>
+            </a:pPr>
+            <a:r>
+              <a:rPr lang="es-CO"/>
+              <a:t>git stash apply stash@{&lt;a&gt;}</a:t>
+            </a:r>
+            <a:endParaRPr lang="es-CO"/>
+          </a:p>
+          <a:p>
+            <a:pPr>
+              <a:defRPr/>
+            </a:pPr>
+            <a:r>
+              <a:rPr lang="es-CO"/>
+              <a:t>a:numero del estas en la listas que quiero retomar</a:t>
+            </a:r>
+            <a:endParaRPr lang="es-CO"/>
+          </a:p>
+          <a:p>
+            <a:pPr>
+              <a:defRPr/>
+            </a:pPr>
+            <a:r>
+              <a:rPr lang="es-CO"/>
+              <a:t>borrar un stash </a:t>
+            </a:r>
+            <a:endParaRPr lang="es-CO"/>
+          </a:p>
+          <a:p>
+            <a:pPr>
+              <a:defRPr/>
+            </a:pPr>
+            <a:r>
+              <a:rPr lang="es-CO"/>
+              <a:t>git stash drop </a:t>
+            </a:r>
+            <a:r>
+              <a:rPr lang="es-CO" sz="1800" b="0" i="0" u="none" strike="noStrike" cap="none" spc="0">
+                <a:solidFill>
+                  <a:schemeClr val="tx1"/>
+                </a:solidFill>
+                <a:latin typeface="+mn-lt"/>
+                <a:ea typeface="+mn-ea"/>
+                <a:cs typeface="+mn-cs"/>
+              </a:rPr>
+              <a:t>stash@{&lt;a&gt;}</a:t>
+            </a:r>
+            <a:endParaRPr lang="es-CO"/>
+          </a:p>
+          <a:p>
+            <a:pPr>
+              <a:defRPr/>
+            </a:pPr>
+            <a:r>
+              <a:rPr lang="es-CO"/>
+              <a:t>a:numero del stash que quiero borrar</a:t>
+            </a:r>
             <a:endParaRPr lang="es-CO"/>
           </a:p>
           <a:p>

</xml_diff>

<commit_message>
cambios en los comandos en la presentacon hasta (push)
</commit_message>
<xml_diff>
--- a/presentasionComandos.pptx
+++ b/presentasionComandos.pptx
@@ -11,6 +11,8 @@
     <p:sldId id="259" r:id="rId6"/>
     <p:sldId id="260" r:id="rId7"/>
     <p:sldId id="261" r:id="rId8"/>
+    <p:sldId id="262" r:id="rId9"/>
+    <p:sldId id="263" r:id="rId10"/>
   </p:sldIdLst>
   <p:sldSz cx="12192000" cy="6858000"/>
   <p:notesSz cx="6858000" cy="12192000"/>
@@ -5719,6 +5721,479 @@
 </p:sld>
 </file>
 
+<file path=ppt/slides/slide7.xml><?xml version="1.0" encoding="utf-8"?>
+<p:sld xmlns:a="http://schemas.openxmlformats.org/drawingml/2006/main" xmlns:r="http://schemas.openxmlformats.org/officeDocument/2006/relationships" xmlns:p="http://schemas.openxmlformats.org/presentationml/2006/main" xmlns:m="http://schemas.openxmlformats.org/officeDocument/2006/math" xmlns:w="http://schemas.openxmlformats.org/wordprocessingml/2006/main" showMasterPhAnim="0" show="1">
+  <p:cSld name="">
+    <p:bg>
+      <p:bgPr shadeToTitle="0">
+        <a:solidFill>
+          <a:schemeClr val="accent1"/>
+        </a:solidFill>
+      </p:bgPr>
+    </p:bg>
+    <p:spTree>
+      <p:nvGrpSpPr>
+        <p:cNvPr id="1" name="" hidden="0"/>
+        <p:cNvGrpSpPr/>
+        <p:nvPr isPhoto="0" userDrawn="0"/>
+      </p:nvGrpSpPr>
+      <p:grpSpPr bwMode="auto">
+        <a:xfrm>
+          <a:off x="0" y="0"/>
+          <a:ext cx="0" cy="0"/>
+          <a:chOff x="0" y="0"/>
+          <a:chExt cx="0" cy="0"/>
+        </a:xfrm>
+      </p:grpSpPr>
+      <p:sp>
+        <p:nvSpPr>
+          <p:cNvPr id="4" name="" hidden="0"/>
+          <p:cNvSpPr/>
+          <p:nvPr isPhoto="0" userDrawn="0"/>
+        </p:nvSpPr>
+        <p:spPr bwMode="auto">
+          <a:xfrm flipH="0" flipV="0">
+            <a:off x="829521" y="700365"/>
+            <a:ext cx="10548074" cy="5915175"/>
+          </a:xfrm>
+          <a:prstGeom prst="rect">
+            <a:avLst/>
+          </a:prstGeom>
+          <a:noFill/>
+        </p:spPr>
+        <p:txBody>
+          <a:bodyPr vertOverflow="overflow" horzOverflow="clip" vert="horz" wrap="square" lIns="91440" tIns="45720" rIns="91440" bIns="45720" numCol="1" spcCol="0" rtlCol="0" fromWordArt="0" anchor="t" anchorCtr="0" forceAA="0" upright="0" compatLnSpc="0">
+            <a:noAutofit/>
+          </a:bodyPr>
+          <a:p>
+            <a:pPr>
+              <a:defRPr/>
+            </a:pPr>
+            <a:r>
+              <a:rPr lang="es-CO"/>
+              <a:t>GITHUB</a:t>
+            </a:r>
+            <a:endParaRPr lang="es-CO"/>
+          </a:p>
+          <a:p>
+            <a:pPr>
+              <a:defRPr/>
+            </a:pPr>
+            <a:r>
+              <a:rPr lang="es-CO"/>
+              <a:t>lista las conecciones con los repositorios remotos</a:t>
+            </a:r>
+            <a:endParaRPr lang="es-CO"/>
+          </a:p>
+          <a:p>
+            <a:pPr>
+              <a:defRPr/>
+            </a:pPr>
+            <a:r>
+              <a:rPr lang="es-CO"/>
+              <a:t>git remote -v</a:t>
+            </a:r>
+            <a:endParaRPr lang="es-CO"/>
+          </a:p>
+          <a:p>
+            <a:pPr>
+              <a:defRPr/>
+            </a:pPr>
+            <a:r>
+              <a:rPr lang="es-CO"/>
+              <a:t>enlzar el repositorio local con GitHub</a:t>
+            </a:r>
+            <a:endParaRPr lang="es-CO"/>
+          </a:p>
+          <a:p>
+            <a:pPr>
+              <a:defRPr/>
+            </a:pPr>
+            <a:r>
+              <a:rPr lang="es-CO"/>
+              <a:t>git remote add &lt;a&gt; &lt;b&gt;</a:t>
+            </a:r>
+            <a:endParaRPr lang="es-CO"/>
+          </a:p>
+          <a:p>
+            <a:pPr>
+              <a:defRPr/>
+            </a:pPr>
+            <a:r>
+              <a:rPr lang="es-CO"/>
+              <a:t>a:nombre del repositorio en la nube ("origin" por convencion)</a:t>
+            </a:r>
+            <a:endParaRPr lang="es-CO"/>
+          </a:p>
+          <a:p>
+            <a:pPr>
+              <a:defRPr/>
+            </a:pPr>
+            <a:r>
+              <a:rPr lang="es-CO"/>
+              <a:t>b:direccion del repositorio de GitHub</a:t>
+            </a:r>
+            <a:endParaRPr lang="es-CO"/>
+          </a:p>
+          <a:p>
+            <a:pPr>
+              <a:defRPr/>
+            </a:pPr>
+            <a:r>
+              <a:rPr lang="es-CO"/>
+              <a:t>eliminar el enlace</a:t>
+            </a:r>
+            <a:endParaRPr lang="es-CO"/>
+          </a:p>
+          <a:p>
+            <a:pPr>
+              <a:defRPr/>
+            </a:pPr>
+            <a:r>
+              <a:rPr lang="es-CO"/>
+              <a:t>git remote remove &lt;a&gt;</a:t>
+            </a:r>
+            <a:endParaRPr lang="es-CO"/>
+          </a:p>
+          <a:p>
+            <a:pPr>
+              <a:defRPr/>
+            </a:pPr>
+            <a:r>
+              <a:rPr lang="es-CO"/>
+              <a:t>a: nombre del repositorio </a:t>
+            </a:r>
+            <a:r>
+              <a:rPr lang="es-CO" sz="1800" b="0" i="0" u="none" strike="noStrike" cap="none" spc="0">
+                <a:solidFill>
+                  <a:schemeClr val="tx1"/>
+                </a:solidFill>
+                <a:latin typeface="+mn-lt"/>
+                <a:ea typeface="+mn-ea"/>
+                <a:cs typeface="+mn-cs"/>
+              </a:rPr>
+              <a:t> </a:t>
+            </a:r>
+            <a:endParaRPr lang="es-CO" sz="1800" b="0" i="0" u="none" strike="noStrike" cap="none" spc="0">
+              <a:solidFill>
+                <a:schemeClr val="tx1"/>
+              </a:solidFill>
+              <a:latin typeface="+mn-lt"/>
+              <a:ea typeface="+mn-ea"/>
+              <a:cs typeface="+mn-cs"/>
+            </a:endParaRPr>
+          </a:p>
+          <a:p>
+            <a:pPr>
+              <a:defRPr/>
+            </a:pPr>
+            <a:r>
+              <a:rPr lang="es-CO" sz="1800" b="0" i="0" u="none" strike="noStrike" cap="none" spc="0">
+                <a:solidFill>
+                  <a:schemeClr val="tx1"/>
+                </a:solidFill>
+                <a:latin typeface="+mn-lt"/>
+                <a:ea typeface="+mn-ea"/>
+                <a:cs typeface="+mn-cs"/>
+              </a:rPr>
+              <a:t>traer los cambios del repositorio remoto</a:t>
+            </a:r>
+            <a:endParaRPr lang="es-CO" sz="1800" b="0" i="0" u="none" strike="noStrike" cap="none" spc="0">
+              <a:solidFill>
+                <a:schemeClr val="tx1"/>
+              </a:solidFill>
+              <a:latin typeface="+mn-lt"/>
+              <a:ea typeface="+mn-ea"/>
+              <a:cs typeface="+mn-cs"/>
+            </a:endParaRPr>
+          </a:p>
+          <a:p>
+            <a:pPr>
+              <a:defRPr/>
+            </a:pPr>
+            <a:r>
+              <a:rPr lang="es-CO" sz="1800" b="0" i="0" u="none" strike="noStrike" cap="none" spc="0">
+                <a:solidFill>
+                  <a:schemeClr val="tx1"/>
+                </a:solidFill>
+                <a:latin typeface="+mn-lt"/>
+                <a:ea typeface="+mn-ea"/>
+                <a:cs typeface="+mn-cs"/>
+              </a:rPr>
+              <a:t>git fetch &lt;a&gt; &lt;b&gt;</a:t>
+            </a:r>
+            <a:endParaRPr lang="es-CO" sz="1800" b="0" i="0" u="none" strike="noStrike" cap="none" spc="0">
+              <a:solidFill>
+                <a:schemeClr val="tx1"/>
+              </a:solidFill>
+              <a:latin typeface="+mn-lt"/>
+              <a:ea typeface="+mn-ea"/>
+              <a:cs typeface="+mn-cs"/>
+            </a:endParaRPr>
+          </a:p>
+          <a:p>
+            <a:pPr>
+              <a:defRPr/>
+            </a:pPr>
+            <a:r>
+              <a:rPr lang="es-CO" sz="1800" b="0" i="0" u="none" strike="noStrike" cap="none" spc="0">
+                <a:solidFill>
+                  <a:schemeClr val="tx1"/>
+                </a:solidFill>
+                <a:latin typeface="+mn-lt"/>
+                <a:ea typeface="+mn-ea"/>
+                <a:cs typeface="+mn-cs"/>
+              </a:rPr>
+              <a:t>a:nombre del repositorio en la nube </a:t>
+            </a:r>
+            <a:r>
+              <a:rPr lang="es-CO" sz="1800" b="0" i="0" u="none" strike="noStrike" cap="none" spc="0">
+                <a:solidFill>
+                  <a:schemeClr val="tx1"/>
+                </a:solidFill>
+                <a:latin typeface="+mn-lt"/>
+                <a:ea typeface="+mn-ea"/>
+                <a:cs typeface="+mn-cs"/>
+              </a:rPr>
+              <a:t>("origin" por convencion)</a:t>
+            </a:r>
+            <a:endParaRPr lang="es-CO"/>
+          </a:p>
+          <a:p>
+            <a:pPr>
+              <a:defRPr/>
+            </a:pPr>
+            <a:r>
+              <a:rPr lang="es-CO"/>
+              <a:t>b:nombre de la rama que me quieo traer "master"</a:t>
+            </a:r>
+            <a:endParaRPr lang="es-CO"/>
+          </a:p>
+          <a:p>
+            <a:pPr>
+              <a:defRPr/>
+            </a:pPr>
+            <a:r>
+              <a:rPr lang="es-CO"/>
+              <a:t>git merge origin/master</a:t>
+            </a:r>
+            <a:endParaRPr lang="es-CO"/>
+          </a:p>
+          <a:p>
+            <a:pPr>
+              <a:defRPr/>
+            </a:pPr>
+            <a:r>
+              <a:rPr lang="es-CO" sz="1800" b="0" i="0" u="none" strike="noStrike" cap="none" spc="0">
+                <a:solidFill>
+                  <a:schemeClr val="tx1"/>
+                </a:solidFill>
+                <a:latin typeface="+mn-lt"/>
+                <a:ea typeface="+mn-ea"/>
+                <a:cs typeface="+mn-cs"/>
+              </a:rPr>
+              <a:t>git merge origin/master allow-unrelated</a:t>
+            </a:r>
+            <a:r>
+              <a:rPr lang="es-CO"/>
+              <a:t>-histories</a:t>
+            </a:r>
+            <a:endParaRPr lang="es-CO"/>
+          </a:p>
+          <a:p>
+            <a:pPr>
+              <a:defRPr/>
+            </a:pPr>
+            <a:r>
+              <a:rPr lang="es-CO"/>
+              <a:t>traer cambos y hacer un merge</a:t>
+            </a:r>
+            <a:endParaRPr lang="es-CO"/>
+          </a:p>
+          <a:p>
+            <a:pPr>
+              <a:defRPr/>
+            </a:pPr>
+            <a:r>
+              <a:rPr lang="es-CO"/>
+              <a:t>git pull origin &lt;a&gt; </a:t>
+            </a:r>
+            <a:endParaRPr lang="es-CO"/>
+          </a:p>
+          <a:p>
+            <a:pPr>
+              <a:defRPr/>
+            </a:pPr>
+            <a:r>
+              <a:rPr lang="es-CO"/>
+              <a:t>a:nombre de la rama que quiero traer</a:t>
+            </a:r>
+            <a:endParaRPr lang="es-CO"/>
+          </a:p>
+          <a:p>
+            <a:pPr>
+              <a:defRPr/>
+            </a:pPr>
+            <a:endParaRPr lang="es-CO" sz="1800"/>
+          </a:p>
+          <a:p>
+            <a:pPr>
+              <a:defRPr/>
+            </a:pPr>
+            <a:endParaRPr lang="es-CO" sz="1800"/>
+          </a:p>
+          <a:p>
+            <a:pPr>
+              <a:defRPr/>
+            </a:pPr>
+            <a:endParaRPr lang="es-CO" sz="1800"/>
+          </a:p>
+        </p:txBody>
+      </p:sp>
+    </p:spTree>
+  </p:cSld>
+  <p:clrMapOvr>
+    <a:masterClrMapping/>
+  </p:clrMapOvr>
+  <mc:AlternateContent xmlns:mc="http://schemas.openxmlformats.org/markup-compatibility/2006">
+    <mc:Choice xmlns:p14="http://schemas.microsoft.com/office/powerpoint/2010/main" Requires="p14">
+      <p:transition p14:dur="2000" advClick="1"/>
+    </mc:Choice>
+    <mc:Fallback>
+      <p:transition advClick="1"/>
+    </mc:Fallback>
+  </mc:AlternateContent>
+</p:sld>
+</file>
+
+<file path=ppt/slides/slide8.xml><?xml version="1.0" encoding="utf-8"?>
+<p:sld xmlns:a="http://schemas.openxmlformats.org/drawingml/2006/main" xmlns:r="http://schemas.openxmlformats.org/officeDocument/2006/relationships" xmlns:p="http://schemas.openxmlformats.org/presentationml/2006/main" xmlns:m="http://schemas.openxmlformats.org/officeDocument/2006/math" xmlns:w="http://schemas.openxmlformats.org/wordprocessingml/2006/main" showMasterPhAnim="0" show="1">
+  <p:cSld name="">
+    <p:bg>
+      <p:bgPr shadeToTitle="0">
+        <a:solidFill>
+          <a:schemeClr val="accent1"/>
+        </a:solidFill>
+      </p:bgPr>
+    </p:bg>
+    <p:spTree>
+      <p:nvGrpSpPr>
+        <p:cNvPr id="1" name="" hidden="0"/>
+        <p:cNvGrpSpPr/>
+        <p:nvPr isPhoto="0" userDrawn="0"/>
+      </p:nvGrpSpPr>
+      <p:grpSpPr bwMode="auto">
+        <a:xfrm>
+          <a:off x="0" y="0"/>
+          <a:ext cx="0" cy="0"/>
+          <a:chOff x="0" y="0"/>
+          <a:chExt cx="0" cy="0"/>
+        </a:xfrm>
+      </p:grpSpPr>
+      <p:sp>
+        <p:nvSpPr>
+          <p:cNvPr id="4" name="" hidden="0"/>
+          <p:cNvSpPr/>
+          <p:nvPr isPhoto="0" userDrawn="0"/>
+        </p:nvSpPr>
+        <p:spPr bwMode="auto">
+          <a:xfrm flipH="0" flipV="0">
+            <a:off x="829521" y="700365"/>
+            <a:ext cx="10548074" cy="5915175"/>
+          </a:xfrm>
+          <a:prstGeom prst="rect">
+            <a:avLst/>
+          </a:prstGeom>
+          <a:noFill/>
+        </p:spPr>
+        <p:txBody>
+          <a:bodyPr vertOverflow="overflow" horzOverflow="clip" vert="horz" wrap="square" lIns="91440" tIns="45720" rIns="91440" bIns="45720" numCol="1" spcCol="0" rtlCol="0" fromWordArt="0" anchor="t" anchorCtr="0" forceAA="0" upright="0" compatLnSpc="0">
+            <a:noAutofit/>
+          </a:bodyPr>
+          <a:p>
+            <a:pPr>
+              <a:defRPr/>
+            </a:pPr>
+            <a:r>
+              <a:rPr lang="es-CO"/>
+              <a:t>GITHUB</a:t>
+            </a:r>
+            <a:endParaRPr lang="es-CO"/>
+          </a:p>
+          <a:p>
+            <a:pPr>
+              <a:defRPr/>
+            </a:pPr>
+            <a:r>
+              <a:rPr lang="es-CO" sz="1800"/>
+              <a:t>envia cambios a GitHub</a:t>
+            </a:r>
+            <a:endParaRPr lang="es-CO" sz="1800"/>
+          </a:p>
+          <a:p>
+            <a:pPr>
+              <a:defRPr/>
+            </a:pPr>
+            <a:r>
+              <a:rPr lang="es-CO" sz="1800"/>
+              <a:t>git push origin &lt;a&gt;</a:t>
+            </a:r>
+            <a:endParaRPr lang="es-CO" sz="1800"/>
+          </a:p>
+          <a:p>
+            <a:pPr>
+              <a:defRPr/>
+            </a:pPr>
+            <a:r>
+              <a:rPr lang="es-CO" sz="1800"/>
+              <a:t>a: nombre de ela rama que quiero enviar</a:t>
+            </a:r>
+            <a:endParaRPr lang="es-CO" sz="1800"/>
+          </a:p>
+          <a:p>
+            <a:pPr>
+              <a:defRPr/>
+            </a:pPr>
+            <a:r>
+              <a:rPr lang="es-CO" sz="1800"/>
+              <a:t>mandar los tags </a:t>
+            </a:r>
+            <a:endParaRPr lang="es-CO" sz="1800"/>
+          </a:p>
+          <a:p>
+            <a:pPr>
+              <a:defRPr/>
+            </a:pPr>
+            <a:r>
+              <a:rPr lang="es-CO" sz="1800"/>
+              <a:t>git push origin master --tags</a:t>
+            </a:r>
+            <a:endParaRPr lang="es-CO" sz="1800"/>
+          </a:p>
+          <a:p>
+            <a:pPr>
+              <a:defRPr/>
+            </a:pPr>
+            <a:endParaRPr lang="es-CO" sz="1800"/>
+          </a:p>
+        </p:txBody>
+      </p:sp>
+    </p:spTree>
+  </p:cSld>
+  <p:clrMapOvr>
+    <a:masterClrMapping/>
+  </p:clrMapOvr>
+  <mc:AlternateContent xmlns:mc="http://schemas.openxmlformats.org/markup-compatibility/2006">
+    <mc:Choice xmlns:p14="http://schemas.microsoft.com/office/powerpoint/2010/main" Requires="p14">
+      <p:transition p14:dur="2000" advClick="1"/>
+    </mc:Choice>
+    <mc:Fallback>
+      <p:transition advClick="1"/>
+    </mc:Fallback>
+  </mc:AlternateContent>
+</p:sld>
+</file>
+
 <file path=ppt/theme/theme1.xml><?xml version="1.0" encoding="utf-8"?>
 <a:theme xmlns:a="http://schemas.openxmlformats.org/drawingml/2006/main" xmlns:r="http://schemas.openxmlformats.org/officeDocument/2006/relationships" xmlns:p="http://schemas.openxmlformats.org/presentationml/2006/main" name="Blank">
   <a:themeElements>

</xml_diff>